<commit_message>
add && operator to week 5 lecture
</commit_message>
<xml_diff>
--- a/Week05/Conditionals.pptx
+++ b/Week05/Conditionals.pptx
@@ -5,25 +5,26 @@
     <p:sldMasterId id="2147483648" r:id="rId1"/>
   </p:sldMasterIdLst>
   <p:notesMasterIdLst>
-    <p:notesMasterId r:id="rId18"/>
+    <p:notesMasterId r:id="rId19"/>
   </p:notesMasterIdLst>
   <p:sldIdLst>
     <p:sldId id="258" r:id="rId2"/>
     <p:sldId id="307" r:id="rId3"/>
     <p:sldId id="308" r:id="rId4"/>
-    <p:sldId id="309" r:id="rId5"/>
-    <p:sldId id="297" r:id="rId6"/>
-    <p:sldId id="310" r:id="rId7"/>
-    <p:sldId id="311" r:id="rId8"/>
-    <p:sldId id="312" r:id="rId9"/>
-    <p:sldId id="313" r:id="rId10"/>
-    <p:sldId id="306" r:id="rId11"/>
-    <p:sldId id="314" r:id="rId12"/>
-    <p:sldId id="315" r:id="rId13"/>
-    <p:sldId id="316" r:id="rId14"/>
-    <p:sldId id="317" r:id="rId15"/>
-    <p:sldId id="318" r:id="rId16"/>
-    <p:sldId id="319" r:id="rId17"/>
+    <p:sldId id="320" r:id="rId5"/>
+    <p:sldId id="309" r:id="rId6"/>
+    <p:sldId id="297" r:id="rId7"/>
+    <p:sldId id="310" r:id="rId8"/>
+    <p:sldId id="311" r:id="rId9"/>
+    <p:sldId id="312" r:id="rId10"/>
+    <p:sldId id="313" r:id="rId11"/>
+    <p:sldId id="306" r:id="rId12"/>
+    <p:sldId id="314" r:id="rId13"/>
+    <p:sldId id="315" r:id="rId14"/>
+    <p:sldId id="316" r:id="rId15"/>
+    <p:sldId id="317" r:id="rId16"/>
+    <p:sldId id="318" r:id="rId17"/>
+    <p:sldId id="319" r:id="rId18"/>
   </p:sldIdLst>
   <p:sldSz cx="12192000" cy="6858000"/>
   <p:notesSz cx="6858000" cy="9144000"/>
@@ -223,7 +224,7 @@
           <a:p>
             <a:fld id="{19104133-B5B0-4351-8158-4F0E5EB1E2BF}" type="datetimeFigureOut">
               <a:rPr lang="en-US" smtClean="0"/>
-              <a:t>3/25/2020</a:t>
+              <a:t>11/4/2020</a:t>
             </a:fld>
             <a:endParaRPr lang="en-US"/>
           </a:p>
@@ -830,7 +831,7 @@
           <a:p>
             <a:fld id="{DEC8F7F9-57EC-49CF-9FCD-2B781E4B449F}" type="slidenum">
               <a:rPr lang="en-US" smtClean="0"/>
-              <a:t>11</a:t>
+              <a:t>12</a:t>
             </a:fld>
             <a:endParaRPr lang="en-US"/>
           </a:p>
@@ -949,7 +950,7 @@
           <a:p>
             <a:fld id="{DEC8F7F9-57EC-49CF-9FCD-2B781E4B449F}" type="slidenum">
               <a:rPr lang="en-US" smtClean="0"/>
-              <a:t>12</a:t>
+              <a:t>13</a:t>
             </a:fld>
             <a:endParaRPr lang="en-US"/>
           </a:p>
@@ -1037,7 +1038,7 @@
           <a:p>
             <a:fld id="{DEC8F7F9-57EC-49CF-9FCD-2B781E4B449F}" type="slidenum">
               <a:rPr lang="en-US" smtClean="0"/>
-              <a:t>13</a:t>
+              <a:t>14</a:t>
             </a:fld>
             <a:endParaRPr lang="en-US"/>
           </a:p>
@@ -1125,7 +1126,7 @@
           <a:p>
             <a:fld id="{DEC8F7F9-57EC-49CF-9FCD-2B781E4B449F}" type="slidenum">
               <a:rPr lang="en-US" smtClean="0"/>
-              <a:t>14</a:t>
+              <a:t>15</a:t>
             </a:fld>
             <a:endParaRPr lang="en-US"/>
           </a:p>
@@ -1213,7 +1214,7 @@
           <a:p>
             <a:fld id="{DEC8F7F9-57EC-49CF-9FCD-2B781E4B449F}" type="slidenum">
               <a:rPr lang="en-US" smtClean="0"/>
-              <a:t>15</a:t>
+              <a:t>16</a:t>
             </a:fld>
             <a:endParaRPr lang="en-US"/>
           </a:p>
@@ -1309,7 +1310,7 @@
           <a:p>
             <a:fld id="{DEC8F7F9-57EC-49CF-9FCD-2B781E4B449F}" type="slidenum">
               <a:rPr lang="en-US" smtClean="0"/>
-              <a:t>16</a:t>
+              <a:t>17</a:t>
             </a:fld>
             <a:endParaRPr lang="en-US"/>
           </a:p>
@@ -1519,7 +1520,7 @@
           <a:p>
             <a:fld id="{DEC8F7F9-57EC-49CF-9FCD-2B781E4B449F}" type="slidenum">
               <a:rPr lang="en-US" smtClean="0"/>
-              <a:t>4</a:t>
+              <a:t>5</a:t>
             </a:fld>
             <a:endParaRPr lang="en-US"/>
           </a:p>
@@ -1611,7 +1612,7 @@
           <a:p>
             <a:fld id="{DEC8F7F9-57EC-49CF-9FCD-2B781E4B449F}" type="slidenum">
               <a:rPr lang="en-US" smtClean="0"/>
-              <a:t>5</a:t>
+              <a:t>6</a:t>
             </a:fld>
             <a:endParaRPr lang="en-US"/>
           </a:p>
@@ -1819,7 +1820,7 @@
           <a:p>
             <a:fld id="{DEC8F7F9-57EC-49CF-9FCD-2B781E4B449F}" type="slidenum">
               <a:rPr lang="en-US" smtClean="0"/>
-              <a:t>6</a:t>
+              <a:t>7</a:t>
             </a:fld>
             <a:endParaRPr lang="en-US"/>
           </a:p>
@@ -1992,7 +1993,7 @@
           <a:p>
             <a:fld id="{DEC8F7F9-57EC-49CF-9FCD-2B781E4B449F}" type="slidenum">
               <a:rPr lang="en-US" smtClean="0"/>
-              <a:t>7</a:t>
+              <a:t>8</a:t>
             </a:fld>
             <a:endParaRPr lang="en-US"/>
           </a:p>
@@ -2100,7 +2101,7 @@
           <a:p>
             <a:fld id="{DEC8F7F9-57EC-49CF-9FCD-2B781E4B449F}" type="slidenum">
               <a:rPr lang="en-US" smtClean="0"/>
-              <a:t>8</a:t>
+              <a:t>9</a:t>
             </a:fld>
             <a:endParaRPr lang="en-US"/>
           </a:p>
@@ -2273,7 +2274,7 @@
           <a:p>
             <a:fld id="{DEC8F7F9-57EC-49CF-9FCD-2B781E4B449F}" type="slidenum">
               <a:rPr lang="en-US" smtClean="0"/>
-              <a:t>9</a:t>
+              <a:t>10</a:t>
             </a:fld>
             <a:endParaRPr lang="en-US"/>
           </a:p>
@@ -2350,11 +2351,7 @@
             </a:r>
             <a:r>
               <a:rPr lang="en-US" baseline="0" dirty="0" smtClean="0"/>
-              <a:t> </a:t>
-            </a:r>
-            <a:r>
-              <a:rPr lang="en-US" baseline="0" dirty="0" smtClean="0"/>
-              <a:t>note how the </a:t>
+              <a:t> note how the </a:t>
             </a:r>
             <a:r>
               <a:rPr lang="en-US" b="1" baseline="0" dirty="0" smtClean="0"/>
@@ -2393,7 +2390,7 @@
           <a:p>
             <a:fld id="{DEC8F7F9-57EC-49CF-9FCD-2B781E4B449F}" type="slidenum">
               <a:rPr lang="en-US" smtClean="0"/>
-              <a:t>10</a:t>
+              <a:t>11</a:t>
             </a:fld>
             <a:endParaRPr lang="en-US"/>
           </a:p>
@@ -2602,7 +2599,7 @@
             <a:fld id="{1C2D31DE-C454-491C-B5C3-F097855E3DF7}" type="datetime4">
               <a:rPr lang="en-US" smtClean="0"/>
               <a:pPr/>
-              <a:t>March 25, 2020</a:t>
+              <a:t>November 4, 2020</a:t>
             </a:fld>
             <a:endParaRPr lang="en-US" dirty="0"/>
           </a:p>
@@ -6002,7 +5999,7 @@
           <a:p>
             <a:fld id="{5958763E-B898-436D-883D-03711491D54A}" type="datetimeFigureOut">
               <a:rPr lang="en-US" smtClean="0"/>
-              <a:t>3/25/2020</a:t>
+              <a:t>11/4/2020</a:t>
             </a:fld>
             <a:endParaRPr lang="en-US"/>
           </a:p>
@@ -6203,7 +6200,7 @@
           <a:p>
             <a:fld id="{5958763E-B898-436D-883D-03711491D54A}" type="datetimeFigureOut">
               <a:rPr lang="en-US" smtClean="0"/>
-              <a:t>3/25/2020</a:t>
+              <a:t>11/4/2020</a:t>
             </a:fld>
             <a:endParaRPr lang="en-US"/>
           </a:p>
@@ -6460,7 +6457,7 @@
           <a:p>
             <a:fld id="{5958763E-B898-436D-883D-03711491D54A}" type="datetimeFigureOut">
               <a:rPr lang="en-US" smtClean="0"/>
-              <a:t>3/25/2020</a:t>
+              <a:t>11/4/2020</a:t>
             </a:fld>
             <a:endParaRPr lang="en-US"/>
           </a:p>
@@ -6815,7 +6812,7 @@
           <a:p>
             <a:fld id="{5958763E-B898-436D-883D-03711491D54A}" type="datetimeFigureOut">
               <a:rPr lang="en-US" smtClean="0"/>
-              <a:t>3/25/2020</a:t>
+              <a:t>11/4/2020</a:t>
             </a:fld>
             <a:endParaRPr lang="en-US"/>
           </a:p>
@@ -7238,7 +7235,7 @@
           <a:p>
             <a:fld id="{5958763E-B898-436D-883D-03711491D54A}" type="datetimeFigureOut">
               <a:rPr lang="en-US" smtClean="0"/>
-              <a:t>3/25/2020</a:t>
+              <a:t>11/4/2020</a:t>
             </a:fld>
             <a:endParaRPr lang="en-US"/>
           </a:p>
@@ -7746,7 +7743,7 @@
           <a:p>
             <a:fld id="{5958763E-B898-436D-883D-03711491D54A}" type="datetimeFigureOut">
               <a:rPr lang="en-US" smtClean="0"/>
-              <a:t>3/25/2020</a:t>
+              <a:t>11/4/2020</a:t>
             </a:fld>
             <a:endParaRPr lang="en-US"/>
           </a:p>
@@ -8204,7 +8201,7 @@
           <a:p>
             <a:fld id="{5958763E-B898-436D-883D-03711491D54A}" type="datetimeFigureOut">
               <a:rPr lang="en-US" smtClean="0"/>
-              <a:t>3/25/2020</a:t>
+              <a:t>11/4/2020</a:t>
             </a:fld>
             <a:endParaRPr lang="en-US"/>
           </a:p>
@@ -8822,7 +8819,7 @@
           <a:p>
             <a:fld id="{5958763E-B898-436D-883D-03711491D54A}" type="datetimeFigureOut">
               <a:rPr lang="en-US" smtClean="0"/>
-              <a:t>3/25/2020</a:t>
+              <a:t>11/4/2020</a:t>
             </a:fld>
             <a:endParaRPr lang="en-US"/>
           </a:p>
@@ -9600,7 +9597,7 @@
           <a:p>
             <a:fld id="{5958763E-B898-436D-883D-03711491D54A}" type="datetimeFigureOut">
               <a:rPr lang="en-US" smtClean="0"/>
-              <a:t>3/25/2020</a:t>
+              <a:t>11/4/2020</a:t>
             </a:fld>
             <a:endParaRPr lang="en-US"/>
           </a:p>
@@ -9711,7 +9708,7 @@
           <a:p>
             <a:fld id="{5958763E-B898-436D-883D-03711491D54A}" type="datetimeFigureOut">
               <a:rPr lang="en-US" smtClean="0"/>
-              <a:t>3/25/2020</a:t>
+              <a:t>11/4/2020</a:t>
             </a:fld>
             <a:endParaRPr lang="en-US"/>
           </a:p>
@@ -10053,7 +10050,7 @@
             <a:fld id="{1C2D31DE-C454-491C-B5C3-F097855E3DF7}" type="datetime4">
               <a:rPr lang="en-US" smtClean="0"/>
               <a:pPr/>
-              <a:t>March 25, 2020</a:t>
+              <a:t>November 4, 2020</a:t>
             </a:fld>
             <a:endParaRPr lang="en-US" dirty="0"/>
           </a:p>
@@ -13213,7 +13210,7 @@
           <a:p>
             <a:fld id="{5958763E-B898-436D-883D-03711491D54A}" type="datetimeFigureOut">
               <a:rPr lang="en-US" smtClean="0"/>
-              <a:t>3/25/2020</a:t>
+              <a:t>11/4/2020</a:t>
             </a:fld>
             <a:endParaRPr lang="en-US"/>
           </a:p>
@@ -13344,7 +13341,7 @@
           <a:p>
             <a:fld id="{5958763E-B898-436D-883D-03711491D54A}" type="datetimeFigureOut">
               <a:rPr lang="en-US" smtClean="0"/>
-              <a:t>3/25/2020</a:t>
+              <a:t>11/4/2020</a:t>
             </a:fld>
             <a:endParaRPr lang="en-US"/>
           </a:p>
@@ -13475,7 +13472,7 @@
           <a:p>
             <a:fld id="{5958763E-B898-436D-883D-03711491D54A}" type="datetimeFigureOut">
               <a:rPr lang="en-US" smtClean="0"/>
-              <a:t>3/25/2020</a:t>
+              <a:t>11/4/2020</a:t>
             </a:fld>
             <a:endParaRPr lang="en-US"/>
           </a:p>
@@ -13606,7 +13603,7 @@
           <a:p>
             <a:fld id="{5958763E-B898-436D-883D-03711491D54A}" type="datetimeFigureOut">
               <a:rPr lang="en-US" smtClean="0"/>
-              <a:t>3/25/2020</a:t>
+              <a:t>11/4/2020</a:t>
             </a:fld>
             <a:endParaRPr lang="en-US"/>
           </a:p>
@@ -13737,7 +13734,7 @@
           <a:p>
             <a:fld id="{5958763E-B898-436D-883D-03711491D54A}" type="datetimeFigureOut">
               <a:rPr lang="en-US" smtClean="0"/>
-              <a:t>3/25/2020</a:t>
+              <a:t>11/4/2020</a:t>
             </a:fld>
             <a:endParaRPr lang="en-US"/>
           </a:p>
@@ -13868,7 +13865,7 @@
           <a:p>
             <a:fld id="{5958763E-B898-436D-883D-03711491D54A}" type="datetimeFigureOut">
               <a:rPr lang="en-US" smtClean="0"/>
-              <a:t>3/25/2020</a:t>
+              <a:t>11/4/2020</a:t>
             </a:fld>
             <a:endParaRPr lang="en-US"/>
           </a:p>
@@ -13999,7 +13996,7 @@
           <a:p>
             <a:fld id="{5958763E-B898-436D-883D-03711491D54A}" type="datetimeFigureOut">
               <a:rPr lang="en-US" smtClean="0"/>
-              <a:t>3/25/2020</a:t>
+              <a:t>11/4/2020</a:t>
             </a:fld>
             <a:endParaRPr lang="en-US"/>
           </a:p>
@@ -14130,7 +14127,7 @@
           <a:p>
             <a:fld id="{5958763E-B898-436D-883D-03711491D54A}" type="datetimeFigureOut">
               <a:rPr lang="en-US" smtClean="0"/>
-              <a:t>3/25/2020</a:t>
+              <a:t>11/4/2020</a:t>
             </a:fld>
             <a:endParaRPr lang="en-US"/>
           </a:p>
@@ -14270,7 +14267,7 @@
           <a:p>
             <a:fld id="{5958763E-B898-436D-883D-03711491D54A}" type="datetimeFigureOut">
               <a:rPr lang="en-US" smtClean="0"/>
-              <a:t>3/25/2020</a:t>
+              <a:t>11/4/2020</a:t>
             </a:fld>
             <a:endParaRPr lang="en-US"/>
           </a:p>
@@ -17631,7 +17628,7 @@
             <a:fld id="{1C2D31DE-C454-491C-B5C3-F097855E3DF7}" type="datetime4">
               <a:rPr lang="en-US" smtClean="0"/>
               <a:pPr/>
-              <a:t>March 25, 2020</a:t>
+              <a:t>November 4, 2020</a:t>
             </a:fld>
             <a:endParaRPr lang="en-US" dirty="0"/>
           </a:p>
@@ -29876,7 +29873,7 @@
           <a:p>
             <a:fld id="{5958763E-B898-436D-883D-03711491D54A}" type="datetimeFigureOut">
               <a:rPr lang="en-US" smtClean="0"/>
-              <a:t>3/25/2020</a:t>
+              <a:t>11/4/2020</a:t>
             </a:fld>
             <a:endParaRPr lang="en-US"/>
           </a:p>
@@ -30285,7 +30282,7 @@
           <a:p>
             <a:fld id="{5958763E-B898-436D-883D-03711491D54A}" type="datetimeFigureOut">
               <a:rPr lang="en-US" smtClean="0"/>
-              <a:t>3/25/2020</a:t>
+              <a:t>11/4/2020</a:t>
             </a:fld>
             <a:endParaRPr lang="en-US"/>
           </a:p>
@@ -30586,7 +30583,7 @@
           <a:p>
             <a:fld id="{5958763E-B898-436D-883D-03711491D54A}" type="datetimeFigureOut">
               <a:rPr lang="en-US" smtClean="0"/>
-              <a:t>3/25/2020</a:t>
+              <a:t>11/4/2020</a:t>
             </a:fld>
             <a:endParaRPr lang="en-US"/>
           </a:p>
@@ -30794,7 +30791,7 @@
           <a:p>
             <a:fld id="{5958763E-B898-436D-883D-03711491D54A}" type="datetimeFigureOut">
               <a:rPr lang="en-US" smtClean="0"/>
-              <a:t>3/25/2020</a:t>
+              <a:t>11/4/2020</a:t>
             </a:fld>
             <a:endParaRPr lang="en-US"/>
           </a:p>
@@ -31062,7 +31059,7 @@
           <a:p>
             <a:fld id="{5958763E-B898-436D-883D-03711491D54A}" type="datetimeFigureOut">
               <a:rPr lang="en-US" smtClean="0"/>
-              <a:t>3/25/2020</a:t>
+              <a:t>11/4/2020</a:t>
             </a:fld>
             <a:endParaRPr lang="en-US"/>
           </a:p>
@@ -31579,7 +31576,7 @@
           <a:p>
             <a:fld id="{5958763E-B898-436D-883D-03711491D54A}" type="datetimeFigureOut">
               <a:rPr lang="en-US" smtClean="0"/>
-              <a:t>3/25/2020</a:t>
+              <a:t>11/4/2020</a:t>
             </a:fld>
             <a:endParaRPr lang="en-US"/>
           </a:p>
@@ -32067,7 +32064,7 @@
           <a:p>
             <a:fld id="{5958763E-B898-436D-883D-03711491D54A}" type="datetimeFigureOut">
               <a:rPr lang="en-US" smtClean="0"/>
-              <a:t>3/25/2020</a:t>
+              <a:t>11/4/2020</a:t>
             </a:fld>
             <a:endParaRPr lang="en-US"/>
           </a:p>
@@ -32893,7 +32890,7 @@
           <a:p>
             <a:fld id="{5958763E-B898-436D-883D-03711491D54A}" type="datetimeFigureOut">
               <a:rPr lang="en-US" smtClean="0"/>
-              <a:t>3/25/2020</a:t>
+              <a:t>11/4/2020</a:t>
             </a:fld>
             <a:endParaRPr lang="en-US"/>
           </a:p>
@@ -33101,7 +33098,7 @@
           <a:p>
             <a:fld id="{5958763E-B898-436D-883D-03711491D54A}" type="datetimeFigureOut">
               <a:rPr lang="en-US" smtClean="0"/>
-              <a:t>3/25/2020</a:t>
+              <a:t>11/4/2020</a:t>
             </a:fld>
             <a:endParaRPr lang="en-US"/>
           </a:p>
@@ -33443,7 +33440,7 @@
           <a:p>
             <a:fld id="{5958763E-B898-436D-883D-03711491D54A}" type="datetimeFigureOut">
               <a:rPr lang="en-US" smtClean="0"/>
-              <a:t>3/25/2020</a:t>
+              <a:t>11/4/2020</a:t>
             </a:fld>
             <a:endParaRPr lang="en-US"/>
           </a:p>
@@ -33680,7 +33677,7 @@
           <a:p>
             <a:fld id="{5958763E-B898-436D-883D-03711491D54A}" type="datetimeFigureOut">
               <a:rPr lang="en-US" smtClean="0"/>
-              <a:t>3/25/2020</a:t>
+              <a:t>11/4/2020</a:t>
             </a:fld>
             <a:endParaRPr lang="en-US"/>
           </a:p>
@@ -33931,7 +33928,7 @@
           <a:p>
             <a:fld id="{5958763E-B898-436D-883D-03711491D54A}" type="datetimeFigureOut">
               <a:rPr lang="en-US" smtClean="0"/>
-              <a:t>3/25/2020</a:t>
+              <a:t>11/4/2020</a:t>
             </a:fld>
             <a:endParaRPr lang="en-US"/>
           </a:p>
@@ -37500,6 +37497,113 @@
 <file path=ppt/slides/slide10.xml><?xml version="1.0" encoding="utf-8"?>
 <p:sld xmlns:a="http://schemas.openxmlformats.org/drawingml/2006/main" xmlns:r="http://schemas.openxmlformats.org/officeDocument/2006/relationships" xmlns:p="http://schemas.openxmlformats.org/presentationml/2006/main">
   <p:cSld>
+    <p:spTree>
+      <p:nvGrpSpPr>
+        <p:cNvPr id="1" name=""/>
+        <p:cNvGrpSpPr/>
+        <p:nvPr/>
+      </p:nvGrpSpPr>
+      <p:grpSpPr>
+        <a:xfrm>
+          <a:off x="0" y="0"/>
+          <a:ext cx="0" cy="0"/>
+          <a:chOff x="0" y="0"/>
+          <a:chExt cx="0" cy="0"/>
+        </a:xfrm>
+      </p:grpSpPr>
+      <p:sp>
+        <p:nvSpPr>
+          <p:cNvPr id="2" name="Title 1"/>
+          <p:cNvSpPr>
+            <a:spLocks noGrp="1"/>
+          </p:cNvSpPr>
+          <p:nvPr>
+            <p:ph type="title"/>
+          </p:nvPr>
+        </p:nvSpPr>
+        <p:spPr/>
+        <p:txBody>
+          <a:bodyPr/>
+          <a:lstStyle/>
+          <a:p>
+            <a:r>
+              <a:rPr lang="en-US" dirty="0"/>
+              <a:t>The </a:t>
+            </a:r>
+            <a:r>
+              <a:rPr lang="en-US" sz="4000" cap="none" dirty="0">
+                <a:solidFill>
+                  <a:schemeClr val="accent1">
+                    <a:lumMod val="20000"/>
+                    <a:lumOff val="80000"/>
+                  </a:schemeClr>
+                </a:solidFill>
+                <a:latin typeface="Consolas" panose="020B0609020204030204" pitchFamily="49" charset="0"/>
+              </a:rPr>
+              <a:t>else</a:t>
+            </a:r>
+            <a:r>
+              <a:rPr lang="en-US" dirty="0"/>
+              <a:t> </a:t>
+            </a:r>
+            <a:r>
+              <a:rPr lang="en-US" dirty="0" smtClean="0"/>
+              <a:t>clause – flowchart</a:t>
+            </a:r>
+            <a:endParaRPr lang="en-US" dirty="0"/>
+          </a:p>
+        </p:txBody>
+      </p:sp>
+      <p:pic>
+        <p:nvPicPr>
+          <p:cNvPr id="5" name="Picture 4"/>
+          <p:cNvPicPr>
+            <a:picLocks noChangeAspect="1"/>
+          </p:cNvPicPr>
+          <p:nvPr/>
+        </p:nvPicPr>
+        <p:blipFill>
+          <a:blip r:embed="rId3"/>
+          <a:stretch>
+            <a:fillRect/>
+          </a:stretch>
+        </p:blipFill>
+        <p:spPr>
+          <a:xfrm>
+            <a:off x="1663110" y="1485900"/>
+            <a:ext cx="8865779" cy="5029200"/>
+          </a:xfrm>
+          <a:prstGeom prst="rect">
+            <a:avLst/>
+          </a:prstGeom>
+        </p:spPr>
+      </p:pic>
+    </p:spTree>
+    <p:extLst>
+      <p:ext uri="{BB962C8B-B14F-4D97-AF65-F5344CB8AC3E}">
+        <p14:creationId xmlns:p14="http://schemas.microsoft.com/office/powerpoint/2010/main" val="716826872"/>
+      </p:ext>
+    </p:extLst>
+  </p:cSld>
+  <p:clrMapOvr>
+    <a:masterClrMapping/>
+  </p:clrMapOvr>
+  <p:transition>
+    <p:fade/>
+  </p:transition>
+  <p:timing>
+    <p:tnLst>
+      <p:par>
+        <p:cTn id="1" dur="indefinite" restart="never" nodeType="tmRoot"/>
+      </p:par>
+    </p:tnLst>
+  </p:timing>
+</p:sld>
+</file>
+
+<file path=ppt/slides/slide11.xml><?xml version="1.0" encoding="utf-8"?>
+<p:sld xmlns:a="http://schemas.openxmlformats.org/drawingml/2006/main" xmlns:r="http://schemas.openxmlformats.org/officeDocument/2006/relationships" xmlns:p="http://schemas.openxmlformats.org/presentationml/2006/main">
+  <p:cSld>
     <p:bg>
       <p:bgPr>
         <a:solidFill>
@@ -37541,11 +37645,7 @@
           <a:p>
             <a:r>
               <a:rPr lang="en-US" dirty="0" smtClean="0"/>
-              <a:t>conditional </a:t>
-            </a:r>
-            <a:r>
-              <a:rPr lang="en-US" dirty="0" smtClean="0"/>
-              <a:t>example</a:t>
+              <a:t>conditional example</a:t>
             </a:r>
             <a:endParaRPr lang="en-US" dirty="0"/>
           </a:p>
@@ -37585,286 +37685,6 @@
     <p:extLst>
       <p:ext uri="{BB962C8B-B14F-4D97-AF65-F5344CB8AC3E}">
         <p14:creationId xmlns:p14="http://schemas.microsoft.com/office/powerpoint/2010/main" val="4149816632"/>
-      </p:ext>
-    </p:extLst>
-  </p:cSld>
-  <p:clrMapOvr>
-    <a:masterClrMapping/>
-  </p:clrMapOvr>
-  <p:transition>
-    <p:fade/>
-  </p:transition>
-  <p:timing>
-    <p:tnLst>
-      <p:par>
-        <p:cTn id="1" dur="indefinite" restart="never" nodeType="tmRoot"/>
-      </p:par>
-    </p:tnLst>
-  </p:timing>
-</p:sld>
-</file>
-
-<file path=ppt/slides/slide11.xml><?xml version="1.0" encoding="utf-8"?>
-<p:sld xmlns:a="http://schemas.openxmlformats.org/drawingml/2006/main" xmlns:r="http://schemas.openxmlformats.org/officeDocument/2006/relationships" xmlns:p="http://schemas.openxmlformats.org/presentationml/2006/main">
-  <p:cSld>
-    <p:spTree>
-      <p:nvGrpSpPr>
-        <p:cNvPr id="1" name=""/>
-        <p:cNvGrpSpPr/>
-        <p:nvPr/>
-      </p:nvGrpSpPr>
-      <p:grpSpPr>
-        <a:xfrm>
-          <a:off x="0" y="0"/>
-          <a:ext cx="0" cy="0"/>
-          <a:chOff x="0" y="0"/>
-          <a:chExt cx="0" cy="0"/>
-        </a:xfrm>
-      </p:grpSpPr>
-      <p:sp>
-        <p:nvSpPr>
-          <p:cNvPr id="2" name="Title 1"/>
-          <p:cNvSpPr>
-            <a:spLocks noGrp="1"/>
-          </p:cNvSpPr>
-          <p:nvPr>
-            <p:ph type="title"/>
-          </p:nvPr>
-        </p:nvSpPr>
-        <p:spPr/>
-        <p:txBody>
-          <a:bodyPr/>
-          <a:lstStyle/>
-          <a:p>
-            <a:r>
-              <a:rPr lang="en-US" dirty="0" smtClean="0"/>
-              <a:t>TIP: Read it like English</a:t>
-            </a:r>
-            <a:endParaRPr lang="en-US" dirty="0"/>
-          </a:p>
-        </p:txBody>
-      </p:sp>
-      <p:sp>
-        <p:nvSpPr>
-          <p:cNvPr id="3" name="Content Placeholder 2"/>
-          <p:cNvSpPr>
-            <a:spLocks noGrp="1"/>
-          </p:cNvSpPr>
-          <p:nvPr>
-            <p:ph idx="1"/>
-          </p:nvPr>
-        </p:nvSpPr>
-        <p:spPr/>
-        <p:txBody>
-          <a:bodyPr/>
-          <a:lstStyle/>
-          <a:p>
-            <a:pPr marL="0" indent="0">
-              <a:buNone/>
-            </a:pPr>
-            <a:r>
-              <a:rPr lang="en-US" sz="3600" dirty="0">
-                <a:solidFill>
-                  <a:srgbClr val="0000FF"/>
-                </a:solidFill>
-                <a:latin typeface="Consolas" panose="020B0609020204030204" pitchFamily="49" charset="0"/>
-              </a:rPr>
-              <a:t>if</a:t>
-            </a:r>
-            <a:r>
-              <a:rPr lang="en-US" sz="3600" dirty="0">
-                <a:solidFill>
-                  <a:srgbClr val="000000"/>
-                </a:solidFill>
-                <a:latin typeface="Consolas" panose="020B0609020204030204" pitchFamily="49" charset="0"/>
-              </a:rPr>
-              <a:t> (</a:t>
-            </a:r>
-            <a:r>
-              <a:rPr lang="en-US" sz="3600" dirty="0" err="1">
-                <a:solidFill>
-                  <a:srgbClr val="000000"/>
-                </a:solidFill>
-                <a:latin typeface="Consolas" panose="020B0609020204030204" pitchFamily="49" charset="0"/>
-              </a:rPr>
-              <a:t>myBalance</a:t>
-            </a:r>
-            <a:r>
-              <a:rPr lang="en-US" sz="3600" dirty="0">
-                <a:solidFill>
-                  <a:srgbClr val="000000"/>
-                </a:solidFill>
-                <a:latin typeface="Consolas" panose="020B0609020204030204" pitchFamily="49" charset="0"/>
-              </a:rPr>
-              <a:t> &lt; </a:t>
-            </a:r>
-            <a:r>
-              <a:rPr lang="en-US" sz="3600" dirty="0">
-                <a:solidFill>
-                  <a:srgbClr val="09885A"/>
-                </a:solidFill>
-                <a:latin typeface="Consolas" panose="020B0609020204030204" pitchFamily="49" charset="0"/>
-              </a:rPr>
-              <a:t>5</a:t>
-            </a:r>
-            <a:r>
-              <a:rPr lang="en-US" sz="3600" dirty="0">
-                <a:solidFill>
-                  <a:srgbClr val="000000"/>
-                </a:solidFill>
-                <a:latin typeface="Consolas" panose="020B0609020204030204" pitchFamily="49" charset="0"/>
-              </a:rPr>
-              <a:t>) {</a:t>
-            </a:r>
-          </a:p>
-          <a:p>
-            <a:pPr marL="0" indent="0">
-              <a:buNone/>
-            </a:pPr>
-            <a:r>
-              <a:rPr lang="en-US" sz="3600" dirty="0">
-                <a:solidFill>
-                  <a:srgbClr val="000000"/>
-                </a:solidFill>
-                <a:latin typeface="Consolas" panose="020B0609020204030204" pitchFamily="49" charset="0"/>
-              </a:rPr>
-              <a:t>	alert(</a:t>
-            </a:r>
-            <a:r>
-              <a:rPr lang="en-US" sz="3600" dirty="0">
-                <a:solidFill>
-                  <a:srgbClr val="A31515"/>
-                </a:solidFill>
-                <a:latin typeface="Consolas" panose="020B0609020204030204" pitchFamily="49" charset="0"/>
-              </a:rPr>
-              <a:t>"You do not have enough money!"</a:t>
-            </a:r>
-            <a:r>
-              <a:rPr lang="en-US" sz="3600" dirty="0">
-                <a:solidFill>
-                  <a:srgbClr val="000000"/>
-                </a:solidFill>
-                <a:latin typeface="Consolas" panose="020B0609020204030204" pitchFamily="49" charset="0"/>
-              </a:rPr>
-              <a:t>);</a:t>
-            </a:r>
-          </a:p>
-          <a:p>
-            <a:pPr marL="0" indent="0">
-              <a:buNone/>
-            </a:pPr>
-            <a:r>
-              <a:rPr lang="en-US" sz="3600" dirty="0">
-                <a:solidFill>
-                  <a:srgbClr val="000000"/>
-                </a:solidFill>
-                <a:latin typeface="Consolas" panose="020B0609020204030204" pitchFamily="49" charset="0"/>
-              </a:rPr>
-              <a:t>} </a:t>
-            </a:r>
-            <a:r>
-              <a:rPr lang="en-US" sz="3600" dirty="0">
-                <a:solidFill>
-                  <a:srgbClr val="0000FF"/>
-                </a:solidFill>
-                <a:latin typeface="Consolas" panose="020B0609020204030204" pitchFamily="49" charset="0"/>
-              </a:rPr>
-              <a:t>else</a:t>
-            </a:r>
-            <a:r>
-              <a:rPr lang="en-US" sz="3600" dirty="0">
-                <a:solidFill>
-                  <a:srgbClr val="000000"/>
-                </a:solidFill>
-                <a:latin typeface="Consolas" panose="020B0609020204030204" pitchFamily="49" charset="0"/>
-              </a:rPr>
-              <a:t> {</a:t>
-            </a:r>
-          </a:p>
-          <a:p>
-            <a:pPr marL="0" indent="0">
-              <a:buNone/>
-            </a:pPr>
-            <a:r>
-              <a:rPr lang="en-US" sz="3600" dirty="0">
-                <a:solidFill>
-                  <a:srgbClr val="000000"/>
-                </a:solidFill>
-                <a:latin typeface="Consolas" panose="020B0609020204030204" pitchFamily="49" charset="0"/>
-              </a:rPr>
-              <a:t>	alert(</a:t>
-            </a:r>
-            <a:r>
-              <a:rPr lang="en-US" sz="3600" dirty="0">
-                <a:solidFill>
-                  <a:srgbClr val="A31515"/>
-                </a:solidFill>
-                <a:latin typeface="Consolas" panose="020B0609020204030204" pitchFamily="49" charset="0"/>
-              </a:rPr>
-              <a:t>"You have enough money!"</a:t>
-            </a:r>
-            <a:r>
-              <a:rPr lang="en-US" sz="3600" dirty="0">
-                <a:solidFill>
-                  <a:srgbClr val="000000"/>
-                </a:solidFill>
-                <a:latin typeface="Consolas" panose="020B0609020204030204" pitchFamily="49" charset="0"/>
-              </a:rPr>
-              <a:t>);</a:t>
-            </a:r>
-          </a:p>
-          <a:p>
-            <a:pPr marL="0" indent="0">
-              <a:buNone/>
-            </a:pPr>
-            <a:r>
-              <a:rPr lang="en-US" sz="3600" dirty="0">
-                <a:solidFill>
-                  <a:srgbClr val="000000"/>
-                </a:solidFill>
-                <a:latin typeface="Consolas" panose="020B0609020204030204" pitchFamily="49" charset="0"/>
-              </a:rPr>
-              <a:t>}</a:t>
-            </a:r>
-          </a:p>
-          <a:p>
-            <a:pPr marL="57150" indent="0">
-              <a:buNone/>
-            </a:pPr>
-            <a:endParaRPr lang="en-US" dirty="0" smtClean="0"/>
-          </a:p>
-          <a:p>
-            <a:pPr lvl="0">
-              <a:buClr>
-                <a:srgbClr val="98989A"/>
-              </a:buClr>
-            </a:pPr>
-            <a:r>
-              <a:rPr lang="en-US" dirty="0" smtClean="0">
-                <a:solidFill>
-                  <a:srgbClr val="56565A"/>
-                </a:solidFill>
-              </a:rPr>
-              <a:t>Try translating the code into an English sentence</a:t>
-            </a:r>
-            <a:endParaRPr lang="en-US" dirty="0">
-              <a:solidFill>
-                <a:srgbClr val="56565A"/>
-              </a:solidFill>
-            </a:endParaRPr>
-          </a:p>
-          <a:p>
-            <a:pPr marL="57150" indent="0">
-              <a:buNone/>
-            </a:pPr>
-            <a:endParaRPr lang="en-US" dirty="0"/>
-          </a:p>
-        </p:txBody>
-      </p:sp>
-    </p:spTree>
-    <p:extLst>
-      <p:ext uri="{BB962C8B-B14F-4D97-AF65-F5344CB8AC3E}">
-        <p14:creationId xmlns:p14="http://schemas.microsoft.com/office/powerpoint/2010/main" val="641057054"/>
       </p:ext>
     </p:extLst>
   </p:cSld>
@@ -37918,7 +37738,7 @@
           <a:p>
             <a:r>
               <a:rPr lang="en-US" dirty="0" smtClean="0"/>
-              <a:t>Mini-quiz: What’s the value?</a:t>
+              <a:t>TIP: Read it like English</a:t>
             </a:r>
             <a:endParaRPr lang="en-US" dirty="0"/>
           </a:p>
@@ -37936,54 +37756,215 @@
         </p:nvSpPr>
         <p:spPr/>
         <p:txBody>
-          <a:bodyPr anchor="ctr">
-            <a:normAutofit/>
-          </a:bodyPr>
+          <a:bodyPr/>
           <a:lstStyle/>
           <a:p>
-            <a:pPr marL="57150" indent="0" algn="ctr">
+            <a:pPr marL="0" indent="0">
               <a:buNone/>
             </a:pPr>
             <a:r>
-              <a:rPr lang="en-US" sz="11500" dirty="0">
+              <a:rPr lang="en-US" sz="3600" dirty="0">
                 <a:solidFill>
-                  <a:srgbClr val="098658"/>
+                  <a:srgbClr val="0000FF"/>
                 </a:solidFill>
                 <a:latin typeface="Consolas" panose="020B0609020204030204" pitchFamily="49" charset="0"/>
               </a:rPr>
-              <a:t>5</a:t>
-            </a:r>
-            <a:r>
-              <a:rPr lang="en-US" sz="11500" dirty="0">
+              <a:t>if</a:t>
+            </a:r>
+            <a:r>
+              <a:rPr lang="en-US" sz="3600" dirty="0">
                 <a:solidFill>
                   <a:srgbClr val="000000"/>
                 </a:solidFill>
                 <a:latin typeface="Consolas" panose="020B0609020204030204" pitchFamily="49" charset="0"/>
               </a:rPr>
-              <a:t> &gt; </a:t>
-            </a:r>
-            <a:r>
-              <a:rPr lang="en-US" sz="11500" dirty="0" smtClean="0">
+              <a:t> (</a:t>
+            </a:r>
+            <a:r>
+              <a:rPr lang="en-US" sz="3600" dirty="0" err="1">
                 <a:solidFill>
-                  <a:srgbClr val="098658"/>
+                  <a:srgbClr val="000000"/>
+                </a:solidFill>
+                <a:latin typeface="Consolas" panose="020B0609020204030204" pitchFamily="49" charset="0"/>
+              </a:rPr>
+              <a:t>myBalance</a:t>
+            </a:r>
+            <a:r>
+              <a:rPr lang="en-US" sz="3600" dirty="0">
+                <a:solidFill>
+                  <a:srgbClr val="000000"/>
+                </a:solidFill>
+                <a:latin typeface="Consolas" panose="020B0609020204030204" pitchFamily="49" charset="0"/>
+              </a:rPr>
+              <a:t> &lt; </a:t>
+            </a:r>
+            <a:r>
+              <a:rPr lang="en-US" sz="3600" dirty="0">
+                <a:solidFill>
+                  <a:srgbClr val="09885A"/>
                 </a:solidFill>
                 <a:latin typeface="Consolas" panose="020B0609020204030204" pitchFamily="49" charset="0"/>
               </a:rPr>
               <a:t>5</a:t>
             </a:r>
-            <a:endParaRPr lang="en-US" sz="11500" dirty="0">
+            <a:r>
+              <a:rPr lang="en-US" sz="3600" dirty="0">
+                <a:solidFill>
+                  <a:srgbClr val="000000"/>
+                </a:solidFill>
+                <a:latin typeface="Consolas" panose="020B0609020204030204" pitchFamily="49" charset="0"/>
+              </a:rPr>
+              <a:t>) {</a:t>
+            </a:r>
+          </a:p>
+          <a:p>
+            <a:pPr marL="0" indent="0">
+              <a:buNone/>
+            </a:pPr>
+            <a:r>
+              <a:rPr lang="en-US" sz="3600" dirty="0">
+                <a:solidFill>
+                  <a:srgbClr val="000000"/>
+                </a:solidFill>
+                <a:latin typeface="Consolas" panose="020B0609020204030204" pitchFamily="49" charset="0"/>
+              </a:rPr>
+              <a:t>	alert(</a:t>
+            </a:r>
+            <a:r>
+              <a:rPr lang="en-US" sz="3600" dirty="0">
+                <a:solidFill>
+                  <a:srgbClr val="A31515"/>
+                </a:solidFill>
+                <a:latin typeface="Consolas" panose="020B0609020204030204" pitchFamily="49" charset="0"/>
+              </a:rPr>
+              <a:t>"You do not have enough money!"</a:t>
+            </a:r>
+            <a:r>
+              <a:rPr lang="en-US" sz="3600" dirty="0">
+                <a:solidFill>
+                  <a:srgbClr val="000000"/>
+                </a:solidFill>
+                <a:latin typeface="Consolas" panose="020B0609020204030204" pitchFamily="49" charset="0"/>
+              </a:rPr>
+              <a:t>);</a:t>
+            </a:r>
+          </a:p>
+          <a:p>
+            <a:pPr marL="0" indent="0">
+              <a:buNone/>
+            </a:pPr>
+            <a:r>
+              <a:rPr lang="en-US" sz="3600" dirty="0">
+                <a:solidFill>
+                  <a:srgbClr val="000000"/>
+                </a:solidFill>
+                <a:latin typeface="Consolas" panose="020B0609020204030204" pitchFamily="49" charset="0"/>
+              </a:rPr>
+              <a:t>} </a:t>
+            </a:r>
+            <a:r>
+              <a:rPr lang="en-US" sz="3600" dirty="0">
+                <a:solidFill>
+                  <a:srgbClr val="0000FF"/>
+                </a:solidFill>
+                <a:latin typeface="Consolas" panose="020B0609020204030204" pitchFamily="49" charset="0"/>
+              </a:rPr>
+              <a:t>else</a:t>
+            </a:r>
+            <a:r>
+              <a:rPr lang="en-US" sz="3600" dirty="0">
+                <a:solidFill>
+                  <a:srgbClr val="000000"/>
+                </a:solidFill>
+                <a:latin typeface="Consolas" panose="020B0609020204030204" pitchFamily="49" charset="0"/>
+              </a:rPr>
+              <a:t> {</a:t>
+            </a:r>
+          </a:p>
+          <a:p>
+            <a:pPr marL="0" indent="0">
+              <a:buNone/>
+            </a:pPr>
+            <a:r>
+              <a:rPr lang="en-US" sz="3600" dirty="0">
+                <a:solidFill>
+                  <a:srgbClr val="000000"/>
+                </a:solidFill>
+                <a:latin typeface="Consolas" panose="020B0609020204030204" pitchFamily="49" charset="0"/>
+              </a:rPr>
+              <a:t>	alert(</a:t>
+            </a:r>
+            <a:r>
+              <a:rPr lang="en-US" sz="3600" dirty="0">
+                <a:solidFill>
+                  <a:srgbClr val="A31515"/>
+                </a:solidFill>
+                <a:latin typeface="Consolas" panose="020B0609020204030204" pitchFamily="49" charset="0"/>
+              </a:rPr>
+              <a:t>"You have enough money!"</a:t>
+            </a:r>
+            <a:r>
+              <a:rPr lang="en-US" sz="3600" dirty="0">
+                <a:solidFill>
+                  <a:srgbClr val="000000"/>
+                </a:solidFill>
+                <a:latin typeface="Consolas" panose="020B0609020204030204" pitchFamily="49" charset="0"/>
+              </a:rPr>
+              <a:t>);</a:t>
+            </a:r>
+          </a:p>
+          <a:p>
+            <a:pPr marL="0" indent="0">
+              <a:buNone/>
+            </a:pPr>
+            <a:r>
+              <a:rPr lang="en-US" sz="3600" dirty="0">
+                <a:solidFill>
+                  <a:srgbClr val="000000"/>
+                </a:solidFill>
+                <a:latin typeface="Consolas" panose="020B0609020204030204" pitchFamily="49" charset="0"/>
+              </a:rPr>
+              <a:t>}</a:t>
+            </a:r>
+          </a:p>
+          <a:p>
+            <a:pPr marL="57150" indent="0">
+              <a:buNone/>
+            </a:pPr>
+            <a:endParaRPr lang="en-US" dirty="0" smtClean="0"/>
+          </a:p>
+          <a:p>
+            <a:pPr lvl="0">
+              <a:buClr>
+                <a:srgbClr val="98989A"/>
+              </a:buClr>
+            </a:pPr>
+            <a:r>
+              <a:rPr lang="en-US" dirty="0" smtClean="0">
+                <a:solidFill>
+                  <a:srgbClr val="56565A"/>
+                </a:solidFill>
+              </a:rPr>
+              <a:t>Try translating the code into an English sentence</a:t>
+            </a:r>
+            <a:endParaRPr lang="en-US" dirty="0">
               <a:solidFill>
-                <a:srgbClr val="000000"/>
+                <a:srgbClr val="56565A"/>
               </a:solidFill>
-              <a:latin typeface="Consolas" panose="020B0609020204030204" pitchFamily="49" charset="0"/>
             </a:endParaRPr>
+          </a:p>
+          <a:p>
+            <a:pPr marL="57150" indent="0">
+              <a:buNone/>
+            </a:pPr>
+            <a:endParaRPr lang="en-US" dirty="0"/>
           </a:p>
         </p:txBody>
       </p:sp>
     </p:spTree>
     <p:extLst>
       <p:ext uri="{BB962C8B-B14F-4D97-AF65-F5344CB8AC3E}">
-        <p14:creationId xmlns:p14="http://schemas.microsoft.com/office/powerpoint/2010/main" val="2521062439"/>
+        <p14:creationId xmlns:p14="http://schemas.microsoft.com/office/powerpoint/2010/main" val="641057054"/>
       </p:ext>
     </p:extLst>
   </p:cSld>
@@ -38060,17 +38041,17 @@
           </a:bodyPr>
           <a:lstStyle/>
           <a:p>
-            <a:pPr marL="0" indent="0" algn="ctr">
+            <a:pPr marL="57150" indent="0" algn="ctr">
               <a:buNone/>
             </a:pPr>
             <a:r>
               <a:rPr lang="en-US" sz="11500" dirty="0">
                 <a:solidFill>
-                  <a:srgbClr val="A31515"/>
+                  <a:srgbClr val="098658"/>
                 </a:solidFill>
                 <a:latin typeface="Consolas" panose="020B0609020204030204" pitchFamily="49" charset="0"/>
               </a:rPr>
-              <a:t>"Hi"</a:t>
+              <a:t>5</a:t>
             </a:r>
             <a:r>
               <a:rPr lang="en-US" sz="11500" dirty="0">
@@ -38079,16 +38060,16 @@
                 </a:solidFill>
                 <a:latin typeface="Consolas" panose="020B0609020204030204" pitchFamily="49" charset="0"/>
               </a:rPr>
-              <a:t> === </a:t>
-            </a:r>
-            <a:r>
-              <a:rPr lang="en-US" sz="11500" dirty="0">
+              <a:t> &gt; </a:t>
+            </a:r>
+            <a:r>
+              <a:rPr lang="en-US" sz="11500" dirty="0" smtClean="0">
                 <a:solidFill>
-                  <a:srgbClr val="A31515"/>
+                  <a:srgbClr val="098658"/>
                 </a:solidFill>
                 <a:latin typeface="Consolas" panose="020B0609020204030204" pitchFamily="49" charset="0"/>
               </a:rPr>
-              <a:t>"Hi"</a:t>
+              <a:t>5</a:t>
             </a:r>
             <a:endParaRPr lang="en-US" sz="11500" dirty="0">
               <a:solidFill>
@@ -38102,7 +38083,7 @@
     </p:spTree>
     <p:extLst>
       <p:ext uri="{BB962C8B-B14F-4D97-AF65-F5344CB8AC3E}">
-        <p14:creationId xmlns:p14="http://schemas.microsoft.com/office/powerpoint/2010/main" val="768053228"/>
+        <p14:creationId xmlns:p14="http://schemas.microsoft.com/office/powerpoint/2010/main" val="2521062439"/>
       </p:ext>
     </p:extLst>
   </p:cSld>
@@ -38183,6 +38164,125 @@
               <a:buNone/>
             </a:pPr>
             <a:r>
+              <a:rPr lang="en-US" sz="11500" dirty="0">
+                <a:solidFill>
+                  <a:srgbClr val="A31515"/>
+                </a:solidFill>
+                <a:latin typeface="Consolas" panose="020B0609020204030204" pitchFamily="49" charset="0"/>
+              </a:rPr>
+              <a:t>"Hi"</a:t>
+            </a:r>
+            <a:r>
+              <a:rPr lang="en-US" sz="11500" dirty="0">
+                <a:solidFill>
+                  <a:srgbClr val="000000"/>
+                </a:solidFill>
+                <a:latin typeface="Consolas" panose="020B0609020204030204" pitchFamily="49" charset="0"/>
+              </a:rPr>
+              <a:t> === </a:t>
+            </a:r>
+            <a:r>
+              <a:rPr lang="en-US" sz="11500" dirty="0">
+                <a:solidFill>
+                  <a:srgbClr val="A31515"/>
+                </a:solidFill>
+                <a:latin typeface="Consolas" panose="020B0609020204030204" pitchFamily="49" charset="0"/>
+              </a:rPr>
+              <a:t>"Hi"</a:t>
+            </a:r>
+            <a:endParaRPr lang="en-US" sz="11500" dirty="0">
+              <a:solidFill>
+                <a:srgbClr val="000000"/>
+              </a:solidFill>
+              <a:latin typeface="Consolas" panose="020B0609020204030204" pitchFamily="49" charset="0"/>
+            </a:endParaRPr>
+          </a:p>
+        </p:txBody>
+      </p:sp>
+    </p:spTree>
+    <p:extLst>
+      <p:ext uri="{BB962C8B-B14F-4D97-AF65-F5344CB8AC3E}">
+        <p14:creationId xmlns:p14="http://schemas.microsoft.com/office/powerpoint/2010/main" val="768053228"/>
+      </p:ext>
+    </p:extLst>
+  </p:cSld>
+  <p:clrMapOvr>
+    <a:masterClrMapping/>
+  </p:clrMapOvr>
+  <p:transition>
+    <p:fade/>
+  </p:transition>
+  <p:timing>
+    <p:tnLst>
+      <p:par>
+        <p:cTn id="1" dur="indefinite" restart="never" nodeType="tmRoot"/>
+      </p:par>
+    </p:tnLst>
+  </p:timing>
+</p:sld>
+</file>
+
+<file path=ppt/slides/slide15.xml><?xml version="1.0" encoding="utf-8"?>
+<p:sld xmlns:a="http://schemas.openxmlformats.org/drawingml/2006/main" xmlns:r="http://schemas.openxmlformats.org/officeDocument/2006/relationships" xmlns:p="http://schemas.openxmlformats.org/presentationml/2006/main">
+  <p:cSld>
+    <p:spTree>
+      <p:nvGrpSpPr>
+        <p:cNvPr id="1" name=""/>
+        <p:cNvGrpSpPr/>
+        <p:nvPr/>
+      </p:nvGrpSpPr>
+      <p:grpSpPr>
+        <a:xfrm>
+          <a:off x="0" y="0"/>
+          <a:ext cx="0" cy="0"/>
+          <a:chOff x="0" y="0"/>
+          <a:chExt cx="0" cy="0"/>
+        </a:xfrm>
+      </p:grpSpPr>
+      <p:sp>
+        <p:nvSpPr>
+          <p:cNvPr id="2" name="Title 1"/>
+          <p:cNvSpPr>
+            <a:spLocks noGrp="1"/>
+          </p:cNvSpPr>
+          <p:nvPr>
+            <p:ph type="title"/>
+          </p:nvPr>
+        </p:nvSpPr>
+        <p:spPr/>
+        <p:txBody>
+          <a:bodyPr/>
+          <a:lstStyle/>
+          <a:p>
+            <a:r>
+              <a:rPr lang="en-US" dirty="0" smtClean="0"/>
+              <a:t>Mini-quiz: What’s the value?</a:t>
+            </a:r>
+            <a:endParaRPr lang="en-US" dirty="0"/>
+          </a:p>
+        </p:txBody>
+      </p:sp>
+      <p:sp>
+        <p:nvSpPr>
+          <p:cNvPr id="3" name="Content Placeholder 2"/>
+          <p:cNvSpPr>
+            <a:spLocks noGrp="1"/>
+          </p:cNvSpPr>
+          <p:nvPr>
+            <p:ph idx="1"/>
+          </p:nvPr>
+        </p:nvSpPr>
+        <p:spPr/>
+        <p:txBody>
+          <a:bodyPr anchor="ctr">
+            <a:normAutofit/>
+          </a:bodyPr>
+          <a:lstStyle/>
+          <a:p>
+            <a:pPr marL="0" indent="0" algn="ctr">
+              <a:buNone/>
+            </a:pPr>
+            <a:r>
               <a:rPr lang="en-US" sz="7200" dirty="0">
                 <a:solidFill>
                   <a:srgbClr val="A31515"/>
@@ -38259,7 +38359,7 @@
 </p:sld>
 </file>
 
-<file path=ppt/slides/slide15.xml><?xml version="1.0" encoding="utf-8"?>
+<file path=ppt/slides/slide16.xml><?xml version="1.0" encoding="utf-8"?>
 <p:sld xmlns:a="http://schemas.openxmlformats.org/drawingml/2006/main" xmlns:r="http://schemas.openxmlformats.org/officeDocument/2006/relationships" xmlns:p="http://schemas.openxmlformats.org/presentationml/2006/main">
   <p:cSld>
     <p:spTree>
@@ -38556,7 +38656,7 @@
 </p:sld>
 </file>
 
-<file path=ppt/slides/slide16.xml><?xml version="1.0" encoding="utf-8"?>
+<file path=ppt/slides/slide17.xml><?xml version="1.0" encoding="utf-8"?>
 <p:sld xmlns:a="http://schemas.openxmlformats.org/drawingml/2006/main" xmlns:r="http://schemas.openxmlformats.org/officeDocument/2006/relationships" xmlns:p="http://schemas.openxmlformats.org/presentationml/2006/main">
   <p:cSld>
     <p:spTree>
@@ -38945,12 +39045,6 @@
               </a:rPr>
               <a:t>}</a:t>
             </a:r>
-            <a:endParaRPr lang="en-US" sz="7200" dirty="0">
-              <a:solidFill>
-                <a:srgbClr val="000000"/>
-              </a:solidFill>
-              <a:latin typeface="Consolas" panose="020B0609020204030204" pitchFamily="49" charset="0"/>
-            </a:endParaRPr>
           </a:p>
         </p:txBody>
       </p:sp>
@@ -40347,6 +40441,2248 @@
           <a:p>
             <a:r>
               <a:rPr lang="en-US" dirty="0" smtClean="0"/>
+              <a:t>THE </a:t>
+            </a:r>
+            <a:r>
+              <a:rPr lang="en-US" sz="3600" dirty="0" smtClean="0">
+                <a:solidFill>
+                  <a:schemeClr val="accent1"/>
+                </a:solidFill>
+                <a:latin typeface="Consolas" panose="020B0609020204030204" pitchFamily="49" charset="0"/>
+              </a:rPr>
+              <a:t>&amp;&amp;</a:t>
+            </a:r>
+            <a:r>
+              <a:rPr lang="en-US" dirty="0" smtClean="0"/>
+              <a:t> Operator</a:t>
+            </a:r>
+            <a:endParaRPr lang="en-US" dirty="0"/>
+          </a:p>
+        </p:txBody>
+      </p:sp>
+      <p:sp>
+        <p:nvSpPr>
+          <p:cNvPr id="3" name="Content Placeholder 2"/>
+          <p:cNvSpPr>
+            <a:spLocks noGrp="1"/>
+          </p:cNvSpPr>
+          <p:nvPr>
+            <p:ph idx="1"/>
+          </p:nvPr>
+        </p:nvSpPr>
+        <p:spPr/>
+        <p:txBody>
+          <a:bodyPr>
+            <a:normAutofit/>
+          </a:bodyPr>
+          <a:lstStyle/>
+          <a:p>
+            <a:r>
+              <a:rPr lang="en-US" dirty="0" smtClean="0"/>
+              <a:t>It is possible to </a:t>
+            </a:r>
+            <a:r>
+              <a:rPr lang="en-US" i="1" dirty="0" smtClean="0"/>
+              <a:t>combine</a:t>
+            </a:r>
+            <a:r>
+              <a:rPr lang="en-US" dirty="0" smtClean="0"/>
+              <a:t> multiple </a:t>
+            </a:r>
+            <a:r>
+              <a:rPr lang="en-US" dirty="0" err="1" smtClean="0"/>
+              <a:t>boolean</a:t>
+            </a:r>
+            <a:r>
+              <a:rPr lang="en-US" dirty="0" smtClean="0"/>
+              <a:t> expressions with &amp;&amp; (AND)</a:t>
+            </a:r>
+          </a:p>
+          <a:p>
+            <a:endParaRPr lang="en-US" dirty="0"/>
+          </a:p>
+          <a:p>
+            <a:r>
+              <a:rPr lang="en-US" dirty="0" smtClean="0"/>
+              <a:t>Examples:</a:t>
+            </a:r>
+            <a:endParaRPr lang="en-US" sz="1800" dirty="0"/>
+          </a:p>
+          <a:p>
+            <a:pPr lvl="1">
+              <a:lnSpc>
+                <a:spcPct val="150000"/>
+              </a:lnSpc>
+            </a:pPr>
+            <a:r>
+              <a:rPr lang="en-US" dirty="0">
+                <a:solidFill>
+                  <a:srgbClr val="0000FF"/>
+                </a:solidFill>
+                <a:latin typeface="Consolas" panose="020B0609020204030204" pitchFamily="49" charset="0"/>
+              </a:rPr>
+              <a:t>true</a:t>
+            </a:r>
+            <a:r>
+              <a:rPr lang="en-US" dirty="0">
+                <a:solidFill>
+                  <a:srgbClr val="000000"/>
+                </a:solidFill>
+                <a:latin typeface="Consolas" panose="020B0609020204030204" pitchFamily="49" charset="0"/>
+              </a:rPr>
+              <a:t> &amp;&amp; </a:t>
+            </a:r>
+            <a:r>
+              <a:rPr lang="en-US" dirty="0">
+                <a:solidFill>
+                  <a:srgbClr val="0000FF"/>
+                </a:solidFill>
+                <a:latin typeface="Consolas" panose="020B0609020204030204" pitchFamily="49" charset="0"/>
+              </a:rPr>
+              <a:t>true</a:t>
+            </a:r>
+            <a:endParaRPr lang="en-US" dirty="0">
+              <a:solidFill>
+                <a:srgbClr val="000000"/>
+              </a:solidFill>
+              <a:latin typeface="Consolas" panose="020B0609020204030204" pitchFamily="49" charset="0"/>
+            </a:endParaRPr>
+          </a:p>
+          <a:p>
+            <a:pPr lvl="1">
+              <a:lnSpc>
+                <a:spcPct val="150000"/>
+              </a:lnSpc>
+            </a:pPr>
+            <a:r>
+              <a:rPr lang="en-US" dirty="0">
+                <a:solidFill>
+                  <a:srgbClr val="0000FF"/>
+                </a:solidFill>
+                <a:latin typeface="Consolas" panose="020B0609020204030204" pitchFamily="49" charset="0"/>
+              </a:rPr>
+              <a:t>true</a:t>
+            </a:r>
+            <a:r>
+              <a:rPr lang="en-US" dirty="0">
+                <a:solidFill>
+                  <a:srgbClr val="000000"/>
+                </a:solidFill>
+                <a:latin typeface="Consolas" panose="020B0609020204030204" pitchFamily="49" charset="0"/>
+              </a:rPr>
+              <a:t> &amp;&amp; </a:t>
+            </a:r>
+            <a:r>
+              <a:rPr lang="en-US" dirty="0">
+                <a:solidFill>
+                  <a:srgbClr val="0000FF"/>
+                </a:solidFill>
+                <a:latin typeface="Consolas" panose="020B0609020204030204" pitchFamily="49" charset="0"/>
+              </a:rPr>
+              <a:t>false</a:t>
+            </a:r>
+            <a:endParaRPr lang="en-US" dirty="0">
+              <a:solidFill>
+                <a:srgbClr val="000000"/>
+              </a:solidFill>
+              <a:latin typeface="Consolas" panose="020B0609020204030204" pitchFamily="49" charset="0"/>
+            </a:endParaRPr>
+          </a:p>
+          <a:p>
+            <a:pPr lvl="1">
+              <a:lnSpc>
+                <a:spcPct val="150000"/>
+              </a:lnSpc>
+            </a:pPr>
+            <a:r>
+              <a:rPr lang="en-US" dirty="0">
+                <a:solidFill>
+                  <a:srgbClr val="098658"/>
+                </a:solidFill>
+                <a:latin typeface="Consolas" panose="020B0609020204030204" pitchFamily="49" charset="0"/>
+              </a:rPr>
+              <a:t>1</a:t>
+            </a:r>
+            <a:r>
+              <a:rPr lang="en-US" dirty="0">
+                <a:solidFill>
+                  <a:srgbClr val="000000"/>
+                </a:solidFill>
+                <a:latin typeface="Consolas" panose="020B0609020204030204" pitchFamily="49" charset="0"/>
+              </a:rPr>
+              <a:t> &gt; </a:t>
+            </a:r>
+            <a:r>
+              <a:rPr lang="en-US" dirty="0">
+                <a:solidFill>
+                  <a:srgbClr val="098658"/>
+                </a:solidFill>
+                <a:latin typeface="Consolas" panose="020B0609020204030204" pitchFamily="49" charset="0"/>
+              </a:rPr>
+              <a:t>0</a:t>
+            </a:r>
+            <a:r>
+              <a:rPr lang="en-US" dirty="0">
+                <a:solidFill>
+                  <a:srgbClr val="000000"/>
+                </a:solidFill>
+                <a:latin typeface="Consolas" panose="020B0609020204030204" pitchFamily="49" charset="0"/>
+              </a:rPr>
+              <a:t> &amp;&amp; </a:t>
+            </a:r>
+            <a:r>
+              <a:rPr lang="en-US" dirty="0">
+                <a:solidFill>
+                  <a:srgbClr val="098658"/>
+                </a:solidFill>
+                <a:latin typeface="Consolas" panose="020B0609020204030204" pitchFamily="49" charset="0"/>
+              </a:rPr>
+              <a:t>1</a:t>
+            </a:r>
+            <a:r>
+              <a:rPr lang="en-US" dirty="0">
+                <a:solidFill>
+                  <a:srgbClr val="000000"/>
+                </a:solidFill>
+                <a:latin typeface="Consolas" panose="020B0609020204030204" pitchFamily="49" charset="0"/>
+              </a:rPr>
+              <a:t> &lt; </a:t>
+            </a:r>
+            <a:r>
+              <a:rPr lang="en-US" dirty="0">
+                <a:solidFill>
+                  <a:srgbClr val="098658"/>
+                </a:solidFill>
+                <a:latin typeface="Consolas" panose="020B0609020204030204" pitchFamily="49" charset="0"/>
+              </a:rPr>
+              <a:t>2</a:t>
+            </a:r>
+            <a:endParaRPr lang="en-US" dirty="0">
+              <a:solidFill>
+                <a:srgbClr val="000000"/>
+              </a:solidFill>
+              <a:latin typeface="Consolas" panose="020B0609020204030204" pitchFamily="49" charset="0"/>
+            </a:endParaRPr>
+          </a:p>
+          <a:p>
+            <a:pPr lvl="1">
+              <a:lnSpc>
+                <a:spcPct val="150000"/>
+              </a:lnSpc>
+            </a:pPr>
+            <a:r>
+              <a:rPr lang="en-US" dirty="0">
+                <a:solidFill>
+                  <a:srgbClr val="098658"/>
+                </a:solidFill>
+                <a:latin typeface="Consolas" panose="020B0609020204030204" pitchFamily="49" charset="0"/>
+              </a:rPr>
+              <a:t>5</a:t>
+            </a:r>
+            <a:r>
+              <a:rPr lang="en-US" dirty="0">
+                <a:solidFill>
+                  <a:srgbClr val="000000"/>
+                </a:solidFill>
+                <a:latin typeface="Consolas" panose="020B0609020204030204" pitchFamily="49" charset="0"/>
+              </a:rPr>
+              <a:t> != </a:t>
+            </a:r>
+            <a:r>
+              <a:rPr lang="en-US" dirty="0">
+                <a:solidFill>
+                  <a:srgbClr val="098658"/>
+                </a:solidFill>
+                <a:latin typeface="Consolas" panose="020B0609020204030204" pitchFamily="49" charset="0"/>
+              </a:rPr>
+              <a:t>5</a:t>
+            </a:r>
+            <a:r>
+              <a:rPr lang="en-US" dirty="0">
+                <a:solidFill>
+                  <a:srgbClr val="000000"/>
+                </a:solidFill>
+                <a:latin typeface="Consolas" panose="020B0609020204030204" pitchFamily="49" charset="0"/>
+              </a:rPr>
+              <a:t> &amp;&amp; </a:t>
+            </a:r>
+            <a:r>
+              <a:rPr lang="en-US" dirty="0">
+                <a:solidFill>
+                  <a:srgbClr val="098658"/>
+                </a:solidFill>
+                <a:latin typeface="Consolas" panose="020B0609020204030204" pitchFamily="49" charset="0"/>
+              </a:rPr>
+              <a:t>3</a:t>
+            </a:r>
+            <a:r>
+              <a:rPr lang="en-US" dirty="0">
+                <a:solidFill>
+                  <a:srgbClr val="000000"/>
+                </a:solidFill>
+                <a:latin typeface="Consolas" panose="020B0609020204030204" pitchFamily="49" charset="0"/>
+              </a:rPr>
+              <a:t> === </a:t>
+            </a:r>
+            <a:r>
+              <a:rPr lang="en-US" dirty="0">
+                <a:solidFill>
+                  <a:srgbClr val="098658"/>
+                </a:solidFill>
+                <a:latin typeface="Consolas" panose="020B0609020204030204" pitchFamily="49" charset="0"/>
+              </a:rPr>
+              <a:t>4</a:t>
+            </a:r>
+            <a:endParaRPr lang="en-US" dirty="0">
+              <a:solidFill>
+                <a:srgbClr val="000000"/>
+              </a:solidFill>
+              <a:latin typeface="Consolas" panose="020B0609020204030204" pitchFamily="49" charset="0"/>
+            </a:endParaRPr>
+          </a:p>
+          <a:p>
+            <a:pPr lvl="1">
+              <a:lnSpc>
+                <a:spcPct val="150000"/>
+              </a:lnSpc>
+            </a:pPr>
+            <a:r>
+              <a:rPr lang="en-US" dirty="0">
+                <a:solidFill>
+                  <a:srgbClr val="000000"/>
+                </a:solidFill>
+                <a:latin typeface="Consolas" panose="020B0609020204030204" pitchFamily="49" charset="0"/>
+              </a:rPr>
+              <a:t>name1 === </a:t>
+            </a:r>
+            <a:r>
+              <a:rPr lang="en-US" dirty="0">
+                <a:solidFill>
+                  <a:srgbClr val="A31515"/>
+                </a:solidFill>
+                <a:latin typeface="Consolas" panose="020B0609020204030204" pitchFamily="49" charset="0"/>
+              </a:rPr>
+              <a:t>"Jim"</a:t>
+            </a:r>
+            <a:r>
+              <a:rPr lang="en-US" dirty="0">
+                <a:solidFill>
+                  <a:srgbClr val="000000"/>
+                </a:solidFill>
+                <a:latin typeface="Consolas" panose="020B0609020204030204" pitchFamily="49" charset="0"/>
+              </a:rPr>
+              <a:t> &amp;&amp; name2 === </a:t>
+            </a:r>
+            <a:r>
+              <a:rPr lang="en-US" dirty="0">
+                <a:solidFill>
+                  <a:srgbClr val="A31515"/>
+                </a:solidFill>
+                <a:latin typeface="Consolas" panose="020B0609020204030204" pitchFamily="49" charset="0"/>
+              </a:rPr>
+              <a:t>"Jane"</a:t>
+            </a:r>
+            <a:endParaRPr lang="en-US" dirty="0">
+              <a:solidFill>
+                <a:srgbClr val="000000"/>
+              </a:solidFill>
+              <a:latin typeface="Consolas" panose="020B0609020204030204" pitchFamily="49" charset="0"/>
+            </a:endParaRPr>
+          </a:p>
+          <a:p>
+            <a:endParaRPr lang="en-US" dirty="0" smtClean="0"/>
+          </a:p>
+        </p:txBody>
+      </p:sp>
+      <p:grpSp>
+        <p:nvGrpSpPr>
+          <p:cNvPr id="16" name="Group 15"/>
+          <p:cNvGrpSpPr/>
+          <p:nvPr/>
+        </p:nvGrpSpPr>
+        <p:grpSpPr>
+          <a:xfrm>
+            <a:off x="3352800" y="2914650"/>
+            <a:ext cx="2171700" cy="571500"/>
+            <a:chOff x="3352800" y="2914650"/>
+            <a:chExt cx="2171700" cy="571500"/>
+          </a:xfrm>
+        </p:grpSpPr>
+        <p:cxnSp>
+          <p:nvCxnSpPr>
+            <p:cNvPr id="5" name="Straight Arrow Connector 4"/>
+            <p:cNvCxnSpPr/>
+            <p:nvPr/>
+          </p:nvCxnSpPr>
+          <p:spPr>
+            <a:xfrm>
+              <a:off x="3352800" y="3200400"/>
+              <a:ext cx="1028700" cy="0"/>
+            </a:xfrm>
+            <a:prstGeom prst="straightConnector1">
+              <a:avLst/>
+            </a:prstGeom>
+            <a:ln w="12700">
+              <a:miter lim="800000"/>
+              <a:headEnd type="none"/>
+              <a:tailEnd type="triangle"/>
+            </a:ln>
+          </p:spPr>
+          <p:style>
+            <a:lnRef idx="1">
+              <a:schemeClr val="dk1"/>
+            </a:lnRef>
+            <a:fillRef idx="0">
+              <a:schemeClr val="dk1"/>
+            </a:fillRef>
+            <a:effectRef idx="0">
+              <a:schemeClr val="dk1"/>
+            </a:effectRef>
+            <a:fontRef idx="minor">
+              <a:schemeClr val="tx1"/>
+            </a:fontRef>
+          </p:style>
+        </p:cxnSp>
+        <p:sp>
+          <p:nvSpPr>
+            <p:cNvPr id="7" name="Rectangle 6"/>
+            <p:cNvSpPr/>
+            <p:nvPr/>
+          </p:nvSpPr>
+          <p:spPr bwMode="auto">
+            <a:xfrm>
+              <a:off x="4495800" y="2914650"/>
+              <a:ext cx="1028700" cy="571500"/>
+            </a:xfrm>
+            <a:prstGeom prst="rect">
+              <a:avLst/>
+            </a:prstGeom>
+            <a:solidFill>
+              <a:schemeClr val="accent1">
+                <a:lumMod val="20000"/>
+                <a:lumOff val="80000"/>
+              </a:schemeClr>
+            </a:solidFill>
+            <a:ln w="25400">
+              <a:solidFill>
+                <a:schemeClr val="accent1"/>
+              </a:solidFill>
+              <a:miter lim="800000"/>
+              <a:headEnd type="none" w="med" len="med"/>
+              <a:tailEnd type="none" w="med" len="med"/>
+            </a:ln>
+            <a:effectLst/>
+          </p:spPr>
+          <p:style>
+            <a:lnRef idx="1">
+              <a:schemeClr val="accent2"/>
+            </a:lnRef>
+            <a:fillRef idx="3">
+              <a:schemeClr val="accent2"/>
+            </a:fillRef>
+            <a:effectRef idx="2">
+              <a:schemeClr val="accent2"/>
+            </a:effectRef>
+            <a:fontRef idx="minor">
+              <a:schemeClr val="lt1"/>
+            </a:fontRef>
+          </p:style>
+          <p:txBody>
+            <a:bodyPr rot="0" spcFirstLastPara="0" vertOverflow="overflow" horzOverflow="overflow" vert="horz" wrap="square" lIns="182880" tIns="146304" rIns="182880" bIns="146304" numCol="1" spcCol="0" rtlCol="0" fromWordArt="0" anchor="t" anchorCtr="0" forceAA="0" compatLnSpc="1">
+              <a:prstTxWarp prst="textNoShape">
+                <a:avLst/>
+              </a:prstTxWarp>
+              <a:noAutofit/>
+            </a:bodyPr>
+            <a:lstStyle/>
+            <a:p>
+              <a:pPr algn="ctr" defTabSz="932472" fontAlgn="base">
+                <a:lnSpc>
+                  <a:spcPct val="90000"/>
+                </a:lnSpc>
+                <a:spcBef>
+                  <a:spcPct val="0"/>
+                </a:spcBef>
+                <a:spcAft>
+                  <a:spcPct val="0"/>
+                </a:spcAft>
+              </a:pPr>
+              <a:r>
+                <a:rPr lang="en-US" sz="2400" dirty="0" smtClean="0">
+                  <a:solidFill>
+                    <a:schemeClr val="accent1">
+                      <a:lumMod val="75000"/>
+                    </a:schemeClr>
+                  </a:solidFill>
+                  <a:ea typeface="Segoe UI" pitchFamily="34" charset="0"/>
+                  <a:cs typeface="Segoe UI" pitchFamily="34" charset="0"/>
+                </a:rPr>
+                <a:t>true</a:t>
+              </a:r>
+              <a:endParaRPr lang="en-US" sz="2400" dirty="0" smtClean="0">
+                <a:solidFill>
+                  <a:schemeClr val="accent1">
+                    <a:lumMod val="75000"/>
+                  </a:schemeClr>
+                </a:solidFill>
+                <a:ea typeface="Segoe UI" pitchFamily="34" charset="0"/>
+                <a:cs typeface="Segoe UI" pitchFamily="34" charset="0"/>
+              </a:endParaRPr>
+            </a:p>
+          </p:txBody>
+        </p:sp>
+      </p:grpSp>
+      <p:grpSp>
+        <p:nvGrpSpPr>
+          <p:cNvPr id="17" name="Group 16"/>
+          <p:cNvGrpSpPr/>
+          <p:nvPr/>
+        </p:nvGrpSpPr>
+        <p:grpSpPr>
+          <a:xfrm>
+            <a:off x="3581400" y="3584986"/>
+            <a:ext cx="2171700" cy="571500"/>
+            <a:chOff x="3581400" y="3584986"/>
+            <a:chExt cx="2171700" cy="571500"/>
+          </a:xfrm>
+        </p:grpSpPr>
+        <p:cxnSp>
+          <p:nvCxnSpPr>
+            <p:cNvPr id="8" name="Straight Arrow Connector 7"/>
+            <p:cNvCxnSpPr/>
+            <p:nvPr/>
+          </p:nvCxnSpPr>
+          <p:spPr>
+            <a:xfrm>
+              <a:off x="3581400" y="3870736"/>
+              <a:ext cx="1028700" cy="0"/>
+            </a:xfrm>
+            <a:prstGeom prst="straightConnector1">
+              <a:avLst/>
+            </a:prstGeom>
+            <a:ln w="12700">
+              <a:miter lim="800000"/>
+              <a:headEnd type="none"/>
+              <a:tailEnd type="triangle"/>
+            </a:ln>
+          </p:spPr>
+          <p:style>
+            <a:lnRef idx="1">
+              <a:schemeClr val="dk1"/>
+            </a:lnRef>
+            <a:fillRef idx="0">
+              <a:schemeClr val="dk1"/>
+            </a:fillRef>
+            <a:effectRef idx="0">
+              <a:schemeClr val="dk1"/>
+            </a:effectRef>
+            <a:fontRef idx="minor">
+              <a:schemeClr val="tx1"/>
+            </a:fontRef>
+          </p:style>
+        </p:cxnSp>
+        <p:sp>
+          <p:nvSpPr>
+            <p:cNvPr id="9" name="Rectangle 8"/>
+            <p:cNvSpPr/>
+            <p:nvPr/>
+          </p:nvSpPr>
+          <p:spPr bwMode="auto">
+            <a:xfrm>
+              <a:off x="4724400" y="3584986"/>
+              <a:ext cx="1028700" cy="571500"/>
+            </a:xfrm>
+            <a:prstGeom prst="rect">
+              <a:avLst/>
+            </a:prstGeom>
+            <a:solidFill>
+              <a:schemeClr val="accent1">
+                <a:lumMod val="20000"/>
+                <a:lumOff val="80000"/>
+              </a:schemeClr>
+            </a:solidFill>
+            <a:ln w="25400">
+              <a:solidFill>
+                <a:schemeClr val="accent1"/>
+              </a:solidFill>
+              <a:miter lim="800000"/>
+              <a:headEnd type="none" w="med" len="med"/>
+              <a:tailEnd type="none" w="med" len="med"/>
+            </a:ln>
+            <a:effectLst/>
+          </p:spPr>
+          <p:style>
+            <a:lnRef idx="1">
+              <a:schemeClr val="accent2"/>
+            </a:lnRef>
+            <a:fillRef idx="3">
+              <a:schemeClr val="accent2"/>
+            </a:fillRef>
+            <a:effectRef idx="2">
+              <a:schemeClr val="accent2"/>
+            </a:effectRef>
+            <a:fontRef idx="minor">
+              <a:schemeClr val="lt1"/>
+            </a:fontRef>
+          </p:style>
+          <p:txBody>
+            <a:bodyPr rot="0" spcFirstLastPara="0" vertOverflow="overflow" horzOverflow="overflow" vert="horz" wrap="square" lIns="182880" tIns="146304" rIns="182880" bIns="146304" numCol="1" spcCol="0" rtlCol="0" fromWordArt="0" anchor="t" anchorCtr="0" forceAA="0" compatLnSpc="1">
+              <a:prstTxWarp prst="textNoShape">
+                <a:avLst/>
+              </a:prstTxWarp>
+              <a:noAutofit/>
+            </a:bodyPr>
+            <a:lstStyle/>
+            <a:p>
+              <a:pPr algn="ctr" defTabSz="932472" fontAlgn="base">
+                <a:lnSpc>
+                  <a:spcPct val="90000"/>
+                </a:lnSpc>
+                <a:spcBef>
+                  <a:spcPct val="0"/>
+                </a:spcBef>
+                <a:spcAft>
+                  <a:spcPct val="0"/>
+                </a:spcAft>
+              </a:pPr>
+              <a:r>
+                <a:rPr lang="en-US" sz="2400" dirty="0" smtClean="0">
+                  <a:solidFill>
+                    <a:schemeClr val="accent1">
+                      <a:lumMod val="75000"/>
+                    </a:schemeClr>
+                  </a:solidFill>
+                  <a:ea typeface="Segoe UI" pitchFamily="34" charset="0"/>
+                  <a:cs typeface="Segoe UI" pitchFamily="34" charset="0"/>
+                </a:rPr>
+                <a:t>false</a:t>
+              </a:r>
+              <a:endParaRPr lang="en-US" sz="2400" dirty="0" smtClean="0">
+                <a:solidFill>
+                  <a:schemeClr val="accent1">
+                    <a:lumMod val="75000"/>
+                  </a:schemeClr>
+                </a:solidFill>
+                <a:ea typeface="Segoe UI" pitchFamily="34" charset="0"/>
+                <a:cs typeface="Segoe UI" pitchFamily="34" charset="0"/>
+              </a:endParaRPr>
+            </a:p>
+          </p:txBody>
+        </p:sp>
+      </p:grpSp>
+      <p:grpSp>
+        <p:nvGrpSpPr>
+          <p:cNvPr id="18" name="Group 17"/>
+          <p:cNvGrpSpPr/>
+          <p:nvPr/>
+        </p:nvGrpSpPr>
+        <p:grpSpPr>
+          <a:xfrm>
+            <a:off x="3695700" y="4322557"/>
+            <a:ext cx="2171700" cy="571500"/>
+            <a:chOff x="3695700" y="4322557"/>
+            <a:chExt cx="2171700" cy="571500"/>
+          </a:xfrm>
+        </p:grpSpPr>
+        <p:cxnSp>
+          <p:nvCxnSpPr>
+            <p:cNvPr id="10" name="Straight Arrow Connector 9"/>
+            <p:cNvCxnSpPr/>
+            <p:nvPr/>
+          </p:nvCxnSpPr>
+          <p:spPr>
+            <a:xfrm>
+              <a:off x="3695700" y="4608307"/>
+              <a:ext cx="1028700" cy="0"/>
+            </a:xfrm>
+            <a:prstGeom prst="straightConnector1">
+              <a:avLst/>
+            </a:prstGeom>
+            <a:ln w="12700">
+              <a:miter lim="800000"/>
+              <a:headEnd type="none"/>
+              <a:tailEnd type="triangle"/>
+            </a:ln>
+          </p:spPr>
+          <p:style>
+            <a:lnRef idx="1">
+              <a:schemeClr val="dk1"/>
+            </a:lnRef>
+            <a:fillRef idx="0">
+              <a:schemeClr val="dk1"/>
+            </a:fillRef>
+            <a:effectRef idx="0">
+              <a:schemeClr val="dk1"/>
+            </a:effectRef>
+            <a:fontRef idx="minor">
+              <a:schemeClr val="tx1"/>
+            </a:fontRef>
+          </p:style>
+        </p:cxnSp>
+        <p:sp>
+          <p:nvSpPr>
+            <p:cNvPr id="11" name="Rectangle 10"/>
+            <p:cNvSpPr/>
+            <p:nvPr/>
+          </p:nvSpPr>
+          <p:spPr bwMode="auto">
+            <a:xfrm>
+              <a:off x="4838700" y="4322557"/>
+              <a:ext cx="1028700" cy="571500"/>
+            </a:xfrm>
+            <a:prstGeom prst="rect">
+              <a:avLst/>
+            </a:prstGeom>
+            <a:solidFill>
+              <a:schemeClr val="accent1">
+                <a:lumMod val="20000"/>
+                <a:lumOff val="80000"/>
+              </a:schemeClr>
+            </a:solidFill>
+            <a:ln w="25400">
+              <a:solidFill>
+                <a:schemeClr val="accent1"/>
+              </a:solidFill>
+              <a:miter lim="800000"/>
+              <a:headEnd type="none" w="med" len="med"/>
+              <a:tailEnd type="none" w="med" len="med"/>
+            </a:ln>
+            <a:effectLst/>
+          </p:spPr>
+          <p:style>
+            <a:lnRef idx="1">
+              <a:schemeClr val="accent2"/>
+            </a:lnRef>
+            <a:fillRef idx="3">
+              <a:schemeClr val="accent2"/>
+            </a:fillRef>
+            <a:effectRef idx="2">
+              <a:schemeClr val="accent2"/>
+            </a:effectRef>
+            <a:fontRef idx="minor">
+              <a:schemeClr val="lt1"/>
+            </a:fontRef>
+          </p:style>
+          <p:txBody>
+            <a:bodyPr rot="0" spcFirstLastPara="0" vertOverflow="overflow" horzOverflow="overflow" vert="horz" wrap="square" lIns="182880" tIns="146304" rIns="182880" bIns="146304" numCol="1" spcCol="0" rtlCol="0" fromWordArt="0" anchor="t" anchorCtr="0" forceAA="0" compatLnSpc="1">
+              <a:prstTxWarp prst="textNoShape">
+                <a:avLst/>
+              </a:prstTxWarp>
+              <a:noAutofit/>
+            </a:bodyPr>
+            <a:lstStyle/>
+            <a:p>
+              <a:pPr algn="ctr" defTabSz="932472" fontAlgn="base">
+                <a:lnSpc>
+                  <a:spcPct val="90000"/>
+                </a:lnSpc>
+                <a:spcBef>
+                  <a:spcPct val="0"/>
+                </a:spcBef>
+                <a:spcAft>
+                  <a:spcPct val="0"/>
+                </a:spcAft>
+              </a:pPr>
+              <a:r>
+                <a:rPr lang="en-US" sz="2400" dirty="0" smtClean="0">
+                  <a:solidFill>
+                    <a:schemeClr val="accent1">
+                      <a:lumMod val="75000"/>
+                    </a:schemeClr>
+                  </a:solidFill>
+                  <a:ea typeface="Segoe UI" pitchFamily="34" charset="0"/>
+                  <a:cs typeface="Segoe UI" pitchFamily="34" charset="0"/>
+                </a:rPr>
+                <a:t>true</a:t>
+              </a:r>
+              <a:endParaRPr lang="en-US" sz="2400" dirty="0" smtClean="0">
+                <a:solidFill>
+                  <a:schemeClr val="accent1">
+                    <a:lumMod val="75000"/>
+                  </a:schemeClr>
+                </a:solidFill>
+                <a:ea typeface="Segoe UI" pitchFamily="34" charset="0"/>
+                <a:cs typeface="Segoe UI" pitchFamily="34" charset="0"/>
+              </a:endParaRPr>
+            </a:p>
+          </p:txBody>
+        </p:sp>
+      </p:grpSp>
+      <p:grpSp>
+        <p:nvGrpSpPr>
+          <p:cNvPr id="19" name="Group 18"/>
+          <p:cNvGrpSpPr/>
+          <p:nvPr/>
+        </p:nvGrpSpPr>
+        <p:grpSpPr>
+          <a:xfrm>
+            <a:off x="4095750" y="4996927"/>
+            <a:ext cx="2171700" cy="571500"/>
+            <a:chOff x="4095750" y="4996927"/>
+            <a:chExt cx="2171700" cy="571500"/>
+          </a:xfrm>
+        </p:grpSpPr>
+        <p:cxnSp>
+          <p:nvCxnSpPr>
+            <p:cNvPr id="12" name="Straight Arrow Connector 11"/>
+            <p:cNvCxnSpPr/>
+            <p:nvPr/>
+          </p:nvCxnSpPr>
+          <p:spPr>
+            <a:xfrm>
+              <a:off x="4095750" y="5282677"/>
+              <a:ext cx="1028700" cy="0"/>
+            </a:xfrm>
+            <a:prstGeom prst="straightConnector1">
+              <a:avLst/>
+            </a:prstGeom>
+            <a:ln w="12700">
+              <a:miter lim="800000"/>
+              <a:headEnd type="none"/>
+              <a:tailEnd type="triangle"/>
+            </a:ln>
+          </p:spPr>
+          <p:style>
+            <a:lnRef idx="1">
+              <a:schemeClr val="dk1"/>
+            </a:lnRef>
+            <a:fillRef idx="0">
+              <a:schemeClr val="dk1"/>
+            </a:fillRef>
+            <a:effectRef idx="0">
+              <a:schemeClr val="dk1"/>
+            </a:effectRef>
+            <a:fontRef idx="minor">
+              <a:schemeClr val="tx1"/>
+            </a:fontRef>
+          </p:style>
+        </p:cxnSp>
+        <p:sp>
+          <p:nvSpPr>
+            <p:cNvPr id="13" name="Rectangle 12"/>
+            <p:cNvSpPr/>
+            <p:nvPr/>
+          </p:nvSpPr>
+          <p:spPr bwMode="auto">
+            <a:xfrm>
+              <a:off x="5238750" y="4996927"/>
+              <a:ext cx="1028700" cy="571500"/>
+            </a:xfrm>
+            <a:prstGeom prst="rect">
+              <a:avLst/>
+            </a:prstGeom>
+            <a:solidFill>
+              <a:schemeClr val="accent1">
+                <a:lumMod val="20000"/>
+                <a:lumOff val="80000"/>
+              </a:schemeClr>
+            </a:solidFill>
+            <a:ln w="25400">
+              <a:solidFill>
+                <a:schemeClr val="accent1"/>
+              </a:solidFill>
+              <a:miter lim="800000"/>
+              <a:headEnd type="none" w="med" len="med"/>
+              <a:tailEnd type="none" w="med" len="med"/>
+            </a:ln>
+            <a:effectLst/>
+          </p:spPr>
+          <p:style>
+            <a:lnRef idx="1">
+              <a:schemeClr val="accent2"/>
+            </a:lnRef>
+            <a:fillRef idx="3">
+              <a:schemeClr val="accent2"/>
+            </a:fillRef>
+            <a:effectRef idx="2">
+              <a:schemeClr val="accent2"/>
+            </a:effectRef>
+            <a:fontRef idx="minor">
+              <a:schemeClr val="lt1"/>
+            </a:fontRef>
+          </p:style>
+          <p:txBody>
+            <a:bodyPr rot="0" spcFirstLastPara="0" vertOverflow="overflow" horzOverflow="overflow" vert="horz" wrap="square" lIns="182880" tIns="146304" rIns="182880" bIns="146304" numCol="1" spcCol="0" rtlCol="0" fromWordArt="0" anchor="t" anchorCtr="0" forceAA="0" compatLnSpc="1">
+              <a:prstTxWarp prst="textNoShape">
+                <a:avLst/>
+              </a:prstTxWarp>
+              <a:noAutofit/>
+            </a:bodyPr>
+            <a:lstStyle/>
+            <a:p>
+              <a:pPr algn="ctr" defTabSz="932472" fontAlgn="base">
+                <a:lnSpc>
+                  <a:spcPct val="90000"/>
+                </a:lnSpc>
+                <a:spcBef>
+                  <a:spcPct val="0"/>
+                </a:spcBef>
+                <a:spcAft>
+                  <a:spcPct val="0"/>
+                </a:spcAft>
+              </a:pPr>
+              <a:r>
+                <a:rPr lang="en-US" sz="2400" dirty="0" smtClean="0">
+                  <a:solidFill>
+                    <a:schemeClr val="accent1">
+                      <a:lumMod val="75000"/>
+                    </a:schemeClr>
+                  </a:solidFill>
+                  <a:ea typeface="Segoe UI" pitchFamily="34" charset="0"/>
+                  <a:cs typeface="Segoe UI" pitchFamily="34" charset="0"/>
+                </a:rPr>
+                <a:t>false</a:t>
+              </a:r>
+              <a:endParaRPr lang="en-US" sz="2400" dirty="0" smtClean="0">
+                <a:solidFill>
+                  <a:schemeClr val="accent1">
+                    <a:lumMod val="75000"/>
+                  </a:schemeClr>
+                </a:solidFill>
+                <a:ea typeface="Segoe UI" pitchFamily="34" charset="0"/>
+                <a:cs typeface="Segoe UI" pitchFamily="34" charset="0"/>
+              </a:endParaRPr>
+            </a:p>
+          </p:txBody>
+        </p:sp>
+      </p:grpSp>
+      <p:grpSp>
+        <p:nvGrpSpPr>
+          <p:cNvPr id="20" name="Group 19"/>
+          <p:cNvGrpSpPr/>
+          <p:nvPr/>
+        </p:nvGrpSpPr>
+        <p:grpSpPr>
+          <a:xfrm>
+            <a:off x="7010400" y="5715000"/>
+            <a:ext cx="2971800" cy="571500"/>
+            <a:chOff x="7010400" y="5715000"/>
+            <a:chExt cx="2971800" cy="571500"/>
+          </a:xfrm>
+        </p:grpSpPr>
+        <p:cxnSp>
+          <p:nvCxnSpPr>
+            <p:cNvPr id="14" name="Straight Arrow Connector 13"/>
+            <p:cNvCxnSpPr/>
+            <p:nvPr/>
+          </p:nvCxnSpPr>
+          <p:spPr>
+            <a:xfrm>
+              <a:off x="7010400" y="6000750"/>
+              <a:ext cx="1028700" cy="0"/>
+            </a:xfrm>
+            <a:prstGeom prst="straightConnector1">
+              <a:avLst/>
+            </a:prstGeom>
+            <a:ln w="12700">
+              <a:miter lim="800000"/>
+              <a:headEnd type="none"/>
+              <a:tailEnd type="triangle"/>
+            </a:ln>
+          </p:spPr>
+          <p:style>
+            <a:lnRef idx="1">
+              <a:schemeClr val="dk1"/>
+            </a:lnRef>
+            <a:fillRef idx="0">
+              <a:schemeClr val="dk1"/>
+            </a:fillRef>
+            <a:effectRef idx="0">
+              <a:schemeClr val="dk1"/>
+            </a:effectRef>
+            <a:fontRef idx="minor">
+              <a:schemeClr val="tx1"/>
+            </a:fontRef>
+          </p:style>
+        </p:cxnSp>
+        <p:sp>
+          <p:nvSpPr>
+            <p:cNvPr id="15" name="Rectangle 14"/>
+            <p:cNvSpPr/>
+            <p:nvPr/>
+          </p:nvSpPr>
+          <p:spPr bwMode="auto">
+            <a:xfrm>
+              <a:off x="8153400" y="5715000"/>
+              <a:ext cx="1828800" cy="571500"/>
+            </a:xfrm>
+            <a:prstGeom prst="rect">
+              <a:avLst/>
+            </a:prstGeom>
+            <a:solidFill>
+              <a:schemeClr val="accent1">
+                <a:lumMod val="20000"/>
+                <a:lumOff val="80000"/>
+              </a:schemeClr>
+            </a:solidFill>
+            <a:ln w="25400">
+              <a:solidFill>
+                <a:schemeClr val="accent1"/>
+              </a:solidFill>
+              <a:miter lim="800000"/>
+              <a:headEnd type="none" w="med" len="med"/>
+              <a:tailEnd type="none" w="med" len="med"/>
+            </a:ln>
+            <a:effectLst/>
+          </p:spPr>
+          <p:style>
+            <a:lnRef idx="1">
+              <a:schemeClr val="accent2"/>
+            </a:lnRef>
+            <a:fillRef idx="3">
+              <a:schemeClr val="accent2"/>
+            </a:fillRef>
+            <a:effectRef idx="2">
+              <a:schemeClr val="accent2"/>
+            </a:effectRef>
+            <a:fontRef idx="minor">
+              <a:schemeClr val="lt1"/>
+            </a:fontRef>
+          </p:style>
+          <p:txBody>
+            <a:bodyPr rot="0" spcFirstLastPara="0" vertOverflow="overflow" horzOverflow="overflow" vert="horz" wrap="square" lIns="182880" tIns="146304" rIns="182880" bIns="146304" numCol="1" spcCol="0" rtlCol="0" fromWordArt="0" anchor="t" anchorCtr="0" forceAA="0" compatLnSpc="1">
+              <a:prstTxWarp prst="textNoShape">
+                <a:avLst/>
+              </a:prstTxWarp>
+              <a:noAutofit/>
+            </a:bodyPr>
+            <a:lstStyle/>
+            <a:p>
+              <a:pPr algn="ctr" defTabSz="932472" fontAlgn="base">
+                <a:lnSpc>
+                  <a:spcPct val="90000"/>
+                </a:lnSpc>
+                <a:spcBef>
+                  <a:spcPct val="0"/>
+                </a:spcBef>
+                <a:spcAft>
+                  <a:spcPct val="0"/>
+                </a:spcAft>
+              </a:pPr>
+              <a:r>
+                <a:rPr lang="en-US" sz="2400" dirty="0" smtClean="0">
+                  <a:solidFill>
+                    <a:schemeClr val="accent1">
+                      <a:lumMod val="75000"/>
+                    </a:schemeClr>
+                  </a:solidFill>
+                  <a:ea typeface="Segoe UI" pitchFamily="34" charset="0"/>
+                  <a:cs typeface="Segoe UI" pitchFamily="34" charset="0"/>
+                </a:rPr>
+                <a:t>Depends!</a:t>
+              </a:r>
+              <a:endParaRPr lang="en-US" sz="2400" dirty="0" smtClean="0">
+                <a:solidFill>
+                  <a:schemeClr val="accent1">
+                    <a:lumMod val="75000"/>
+                  </a:schemeClr>
+                </a:solidFill>
+                <a:ea typeface="Segoe UI" pitchFamily="34" charset="0"/>
+                <a:cs typeface="Segoe UI" pitchFamily="34" charset="0"/>
+              </a:endParaRPr>
+            </a:p>
+          </p:txBody>
+        </p:sp>
+      </p:grpSp>
+      <p:graphicFrame>
+        <p:nvGraphicFramePr>
+          <p:cNvPr id="21" name="Table 20"/>
+          <p:cNvGraphicFramePr>
+            <a:graphicFrameLocks noGrp="1"/>
+          </p:cNvGraphicFramePr>
+          <p:nvPr>
+            <p:extLst>
+              <p:ext uri="{D42A27DB-BD31-4B8C-83A1-F6EECF244321}">
+                <p14:modId xmlns:p14="http://schemas.microsoft.com/office/powerpoint/2010/main" val="3976373889"/>
+              </p:ext>
+            </p:extLst>
+          </p:nvPr>
+        </p:nvGraphicFramePr>
+        <p:xfrm>
+          <a:off x="6994713" y="1896373"/>
+          <a:ext cx="4016188" cy="2779505"/>
+        </p:xfrm>
+        <a:graphic>
+          <a:graphicData uri="http://schemas.openxmlformats.org/drawingml/2006/table">
+            <a:tbl>
+              <a:tblPr firstRow="1" bandRow="1">
+                <a:tableStyleId>{69012ECD-51FC-41F1-AA8D-1B2483CD663E}</a:tableStyleId>
+              </a:tblPr>
+              <a:tblGrid>
+                <a:gridCol w="1084573">
+                  <a:extLst>
+                    <a:ext uri="{9D8B030D-6E8A-4147-A177-3AD203B41FA5}">
+                      <a16:colId xmlns:a16="http://schemas.microsoft.com/office/drawing/2014/main" val="2598051297"/>
+                    </a:ext>
+                  </a:extLst>
+                </a:gridCol>
+                <a:gridCol w="1010901">
+                  <a:extLst>
+                    <a:ext uri="{9D8B030D-6E8A-4147-A177-3AD203B41FA5}">
+                      <a16:colId xmlns:a16="http://schemas.microsoft.com/office/drawing/2014/main" val="3495087021"/>
+                    </a:ext>
+                  </a:extLst>
+                </a:gridCol>
+                <a:gridCol w="1920714">
+                  <a:extLst>
+                    <a:ext uri="{9D8B030D-6E8A-4147-A177-3AD203B41FA5}">
+                      <a16:colId xmlns:a16="http://schemas.microsoft.com/office/drawing/2014/main" val="2620126256"/>
+                    </a:ext>
+                  </a:extLst>
+                </a:gridCol>
+              </a:tblGrid>
+              <a:tr h="555901">
+                <a:tc>
+                  <a:txBody>
+                    <a:bodyPr/>
+                    <a:lstStyle/>
+                    <a:p>
+                      <a:pPr algn="ctr"/>
+                      <a:r>
+                        <a:rPr lang="en-US" sz="2800" dirty="0" smtClean="0"/>
+                        <a:t>A</a:t>
+                      </a:r>
+                      <a:endParaRPr lang="en-US" sz="2800" dirty="0"/>
+                    </a:p>
+                  </a:txBody>
+                  <a:tcPr anchor="ctr"/>
+                </a:tc>
+                <a:tc>
+                  <a:txBody>
+                    <a:bodyPr/>
+                    <a:lstStyle/>
+                    <a:p>
+                      <a:pPr algn="ctr"/>
+                      <a:r>
+                        <a:rPr lang="en-US" sz="2800" dirty="0" smtClean="0"/>
+                        <a:t>B</a:t>
+                      </a:r>
+                      <a:endParaRPr lang="en-US" sz="2800" dirty="0"/>
+                    </a:p>
+                  </a:txBody>
+                  <a:tcPr anchor="ctr"/>
+                </a:tc>
+                <a:tc>
+                  <a:txBody>
+                    <a:bodyPr/>
+                    <a:lstStyle/>
+                    <a:p>
+                      <a:pPr algn="ctr"/>
+                      <a:r>
+                        <a:rPr lang="en-US" sz="2800" dirty="0" smtClean="0"/>
+                        <a:t>A &amp;&amp; B</a:t>
+                      </a:r>
+                      <a:endParaRPr lang="en-US" sz="2800" dirty="0"/>
+                    </a:p>
+                  </a:txBody>
+                  <a:tcPr anchor="ctr"/>
+                </a:tc>
+                <a:extLst>
+                  <a:ext uri="{0D108BD9-81ED-4DB2-BD59-A6C34878D82A}">
+                    <a16:rowId xmlns:a16="http://schemas.microsoft.com/office/drawing/2014/main" val="2104092184"/>
+                  </a:ext>
+                </a:extLst>
+              </a:tr>
+              <a:tr h="555901">
+                <a:tc>
+                  <a:txBody>
+                    <a:bodyPr/>
+                    <a:lstStyle/>
+                    <a:p>
+                      <a:pPr algn="ctr"/>
+                      <a:r>
+                        <a:rPr lang="en-US" sz="2400" dirty="0" smtClean="0">
+                          <a:solidFill>
+                            <a:schemeClr val="accent1">
+                              <a:lumMod val="75000"/>
+                            </a:schemeClr>
+                          </a:solidFill>
+                        </a:rPr>
+                        <a:t>true</a:t>
+                      </a:r>
+                      <a:endParaRPr lang="en-US" sz="2400" dirty="0">
+                        <a:solidFill>
+                          <a:schemeClr val="accent1">
+                            <a:lumMod val="75000"/>
+                          </a:schemeClr>
+                        </a:solidFill>
+                      </a:endParaRPr>
+                    </a:p>
+                  </a:txBody>
+                  <a:tcPr anchor="ctr"/>
+                </a:tc>
+                <a:tc>
+                  <a:txBody>
+                    <a:bodyPr/>
+                    <a:lstStyle/>
+                    <a:p>
+                      <a:pPr algn="ctr"/>
+                      <a:r>
+                        <a:rPr lang="en-US" sz="2400" dirty="0" smtClean="0">
+                          <a:solidFill>
+                            <a:schemeClr val="accent1">
+                              <a:lumMod val="75000"/>
+                            </a:schemeClr>
+                          </a:solidFill>
+                        </a:rPr>
+                        <a:t>true</a:t>
+                      </a:r>
+                      <a:endParaRPr lang="en-US" sz="2400" dirty="0">
+                        <a:solidFill>
+                          <a:schemeClr val="accent1">
+                            <a:lumMod val="75000"/>
+                          </a:schemeClr>
+                        </a:solidFill>
+                      </a:endParaRPr>
+                    </a:p>
+                  </a:txBody>
+                  <a:tcPr anchor="ctr"/>
+                </a:tc>
+                <a:tc>
+                  <a:txBody>
+                    <a:bodyPr/>
+                    <a:lstStyle/>
+                    <a:p>
+                      <a:pPr algn="ctr"/>
+                      <a:r>
+                        <a:rPr lang="en-US" sz="2400" b="1" dirty="0" smtClean="0">
+                          <a:solidFill>
+                            <a:schemeClr val="accent1">
+                              <a:lumMod val="75000"/>
+                            </a:schemeClr>
+                          </a:solidFill>
+                        </a:rPr>
+                        <a:t>true</a:t>
+                      </a:r>
+                      <a:endParaRPr lang="en-US" sz="2400" b="1" dirty="0">
+                        <a:solidFill>
+                          <a:schemeClr val="accent1">
+                            <a:lumMod val="75000"/>
+                          </a:schemeClr>
+                        </a:solidFill>
+                      </a:endParaRPr>
+                    </a:p>
+                  </a:txBody>
+                  <a:tcPr anchor="ctr"/>
+                </a:tc>
+                <a:extLst>
+                  <a:ext uri="{0D108BD9-81ED-4DB2-BD59-A6C34878D82A}">
+                    <a16:rowId xmlns:a16="http://schemas.microsoft.com/office/drawing/2014/main" val="2688319902"/>
+                  </a:ext>
+                </a:extLst>
+              </a:tr>
+              <a:tr h="555901">
+                <a:tc>
+                  <a:txBody>
+                    <a:bodyPr/>
+                    <a:lstStyle/>
+                    <a:p>
+                      <a:pPr algn="ctr"/>
+                      <a:r>
+                        <a:rPr lang="en-US" sz="2400" dirty="0" smtClean="0">
+                          <a:solidFill>
+                            <a:schemeClr val="accent1">
+                              <a:lumMod val="75000"/>
+                            </a:schemeClr>
+                          </a:solidFill>
+                        </a:rPr>
+                        <a:t>true</a:t>
+                      </a:r>
+                      <a:endParaRPr lang="en-US" sz="2400" dirty="0">
+                        <a:solidFill>
+                          <a:schemeClr val="accent1">
+                            <a:lumMod val="75000"/>
+                          </a:schemeClr>
+                        </a:solidFill>
+                      </a:endParaRPr>
+                    </a:p>
+                  </a:txBody>
+                  <a:tcPr anchor="ctr"/>
+                </a:tc>
+                <a:tc>
+                  <a:txBody>
+                    <a:bodyPr/>
+                    <a:lstStyle/>
+                    <a:p>
+                      <a:pPr algn="ctr"/>
+                      <a:r>
+                        <a:rPr lang="en-US" sz="2400" dirty="0" smtClean="0"/>
+                        <a:t>false</a:t>
+                      </a:r>
+                      <a:endParaRPr lang="en-US" sz="2400" dirty="0"/>
+                    </a:p>
+                  </a:txBody>
+                  <a:tcPr anchor="ctr"/>
+                </a:tc>
+                <a:tc>
+                  <a:txBody>
+                    <a:bodyPr/>
+                    <a:lstStyle/>
+                    <a:p>
+                      <a:pPr algn="ctr"/>
+                      <a:r>
+                        <a:rPr lang="en-US" sz="2400" b="1" dirty="0" smtClean="0"/>
+                        <a:t>false</a:t>
+                      </a:r>
+                      <a:endParaRPr lang="en-US" sz="2400" b="1" dirty="0"/>
+                    </a:p>
+                  </a:txBody>
+                  <a:tcPr anchor="ctr"/>
+                </a:tc>
+                <a:extLst>
+                  <a:ext uri="{0D108BD9-81ED-4DB2-BD59-A6C34878D82A}">
+                    <a16:rowId xmlns:a16="http://schemas.microsoft.com/office/drawing/2014/main" val="3314322120"/>
+                  </a:ext>
+                </a:extLst>
+              </a:tr>
+              <a:tr h="555901">
+                <a:tc>
+                  <a:txBody>
+                    <a:bodyPr/>
+                    <a:lstStyle/>
+                    <a:p>
+                      <a:pPr algn="ctr"/>
+                      <a:r>
+                        <a:rPr lang="en-US" sz="2400" dirty="0" smtClean="0"/>
+                        <a:t>false</a:t>
+                      </a:r>
+                      <a:endParaRPr lang="en-US" sz="2400" dirty="0"/>
+                    </a:p>
+                  </a:txBody>
+                  <a:tcPr anchor="ctr"/>
+                </a:tc>
+                <a:tc>
+                  <a:txBody>
+                    <a:bodyPr/>
+                    <a:lstStyle/>
+                    <a:p>
+                      <a:pPr algn="ctr"/>
+                      <a:r>
+                        <a:rPr lang="en-US" sz="2400" dirty="0" smtClean="0">
+                          <a:solidFill>
+                            <a:schemeClr val="accent1">
+                              <a:lumMod val="75000"/>
+                            </a:schemeClr>
+                          </a:solidFill>
+                        </a:rPr>
+                        <a:t>true</a:t>
+                      </a:r>
+                      <a:endParaRPr lang="en-US" sz="2400" dirty="0">
+                        <a:solidFill>
+                          <a:schemeClr val="accent1">
+                            <a:lumMod val="75000"/>
+                          </a:schemeClr>
+                        </a:solidFill>
+                      </a:endParaRPr>
+                    </a:p>
+                  </a:txBody>
+                  <a:tcPr anchor="ctr"/>
+                </a:tc>
+                <a:tc>
+                  <a:txBody>
+                    <a:bodyPr/>
+                    <a:lstStyle/>
+                    <a:p>
+                      <a:pPr algn="ctr"/>
+                      <a:r>
+                        <a:rPr lang="en-US" sz="2400" b="1" dirty="0" smtClean="0"/>
+                        <a:t>false</a:t>
+                      </a:r>
+                      <a:endParaRPr lang="en-US" sz="2400" b="1" dirty="0"/>
+                    </a:p>
+                  </a:txBody>
+                  <a:tcPr anchor="ctr"/>
+                </a:tc>
+                <a:extLst>
+                  <a:ext uri="{0D108BD9-81ED-4DB2-BD59-A6C34878D82A}">
+                    <a16:rowId xmlns:a16="http://schemas.microsoft.com/office/drawing/2014/main" val="1520172012"/>
+                  </a:ext>
+                </a:extLst>
+              </a:tr>
+              <a:tr h="555901">
+                <a:tc>
+                  <a:txBody>
+                    <a:bodyPr/>
+                    <a:lstStyle/>
+                    <a:p>
+                      <a:pPr algn="ctr"/>
+                      <a:r>
+                        <a:rPr lang="en-US" sz="2400" dirty="0" smtClean="0"/>
+                        <a:t>false</a:t>
+                      </a:r>
+                      <a:endParaRPr lang="en-US" sz="2400" dirty="0"/>
+                    </a:p>
+                  </a:txBody>
+                  <a:tcPr anchor="ctr"/>
+                </a:tc>
+                <a:tc>
+                  <a:txBody>
+                    <a:bodyPr/>
+                    <a:lstStyle/>
+                    <a:p>
+                      <a:pPr algn="ctr"/>
+                      <a:r>
+                        <a:rPr lang="en-US" sz="2400" dirty="0" smtClean="0"/>
+                        <a:t>false</a:t>
+                      </a:r>
+                      <a:endParaRPr lang="en-US" sz="2400" dirty="0"/>
+                    </a:p>
+                  </a:txBody>
+                  <a:tcPr anchor="ctr"/>
+                </a:tc>
+                <a:tc>
+                  <a:txBody>
+                    <a:bodyPr/>
+                    <a:lstStyle/>
+                    <a:p>
+                      <a:pPr algn="ctr"/>
+                      <a:r>
+                        <a:rPr lang="en-US" sz="2400" b="1" dirty="0" smtClean="0"/>
+                        <a:t>false</a:t>
+                      </a:r>
+                      <a:endParaRPr lang="en-US" sz="2400" b="1" dirty="0"/>
+                    </a:p>
+                  </a:txBody>
+                  <a:tcPr anchor="ctr"/>
+                </a:tc>
+                <a:extLst>
+                  <a:ext uri="{0D108BD9-81ED-4DB2-BD59-A6C34878D82A}">
+                    <a16:rowId xmlns:a16="http://schemas.microsoft.com/office/drawing/2014/main" val="3274212768"/>
+                  </a:ext>
+                </a:extLst>
+              </a:tr>
+            </a:tbl>
+          </a:graphicData>
+        </a:graphic>
+      </p:graphicFrame>
+    </p:spTree>
+    <p:extLst>
+      <p:ext uri="{BB962C8B-B14F-4D97-AF65-F5344CB8AC3E}">
+        <p14:creationId xmlns:p14="http://schemas.microsoft.com/office/powerpoint/2010/main" val="211179168"/>
+      </p:ext>
+    </p:extLst>
+  </p:cSld>
+  <p:clrMapOvr>
+    <a:masterClrMapping/>
+  </p:clrMapOvr>
+  <p:transition>
+    <p:fade/>
+  </p:transition>
+  <p:timing>
+    <p:tnLst>
+      <p:par>
+        <p:cTn id="1" dur="indefinite" restart="never" nodeType="tmRoot">
+          <p:childTnLst>
+            <p:seq concurrent="1" nextAc="seek">
+              <p:cTn id="2" dur="indefinite" nodeType="mainSeq">
+                <p:childTnLst>
+                  <p:par>
+                    <p:cTn id="3" fill="hold">
+                      <p:stCondLst>
+                        <p:cond delay="indefinite"/>
+                      </p:stCondLst>
+                      <p:childTnLst>
+                        <p:par>
+                          <p:cTn id="4" fill="hold">
+                            <p:stCondLst>
+                              <p:cond delay="0"/>
+                            </p:stCondLst>
+                            <p:childTnLst>
+                              <p:par>
+                                <p:cTn id="5" presetID="10" presetClass="entr" presetSubtype="0" fill="hold" grpId="0" nodeType="clickEffect">
+                                  <p:stCondLst>
+                                    <p:cond delay="0"/>
+                                  </p:stCondLst>
+                                  <p:childTnLst>
+                                    <p:set>
+                                      <p:cBhvr>
+                                        <p:cTn id="6" dur="1" fill="hold">
+                                          <p:stCondLst>
+                                            <p:cond delay="0"/>
+                                          </p:stCondLst>
+                                        </p:cTn>
+                                        <p:tgtEl>
+                                          <p:spTgt spid="3">
+                                            <p:txEl>
+                                              <p:pRg st="0" end="0"/>
+                                            </p:txEl>
+                                          </p:spTgt>
+                                        </p:tgtEl>
+                                        <p:attrNameLst>
+                                          <p:attrName>style.visibility</p:attrName>
+                                        </p:attrNameLst>
+                                      </p:cBhvr>
+                                      <p:to>
+                                        <p:strVal val="visible"/>
+                                      </p:to>
+                                    </p:set>
+                                    <p:animEffect transition="in" filter="fade">
+                                      <p:cBhvr>
+                                        <p:cTn id="7" dur="500"/>
+                                        <p:tgtEl>
+                                          <p:spTgt spid="3">
+                                            <p:txEl>
+                                              <p:pRg st="0" end="0"/>
+                                            </p:txEl>
+                                          </p:spTgt>
+                                        </p:tgtEl>
+                                      </p:cBhvr>
+                                    </p:animEffect>
+                                  </p:childTnLst>
+                                </p:cTn>
+                              </p:par>
+                            </p:childTnLst>
+                          </p:cTn>
+                        </p:par>
+                      </p:childTnLst>
+                    </p:cTn>
+                  </p:par>
+                  <p:par>
+                    <p:cTn id="8" fill="hold">
+                      <p:stCondLst>
+                        <p:cond delay="indefinite"/>
+                      </p:stCondLst>
+                      <p:childTnLst>
+                        <p:par>
+                          <p:cTn id="9" fill="hold">
+                            <p:stCondLst>
+                              <p:cond delay="0"/>
+                            </p:stCondLst>
+                            <p:childTnLst>
+                              <p:par>
+                                <p:cTn id="10" presetID="10" presetClass="entr" presetSubtype="0" fill="hold" grpId="0" nodeType="clickEffect">
+                                  <p:stCondLst>
+                                    <p:cond delay="0"/>
+                                  </p:stCondLst>
+                                  <p:childTnLst>
+                                    <p:set>
+                                      <p:cBhvr>
+                                        <p:cTn id="11" dur="1" fill="hold">
+                                          <p:stCondLst>
+                                            <p:cond delay="0"/>
+                                          </p:stCondLst>
+                                        </p:cTn>
+                                        <p:tgtEl>
+                                          <p:spTgt spid="3">
+                                            <p:txEl>
+                                              <p:pRg st="2" end="2"/>
+                                            </p:txEl>
+                                          </p:spTgt>
+                                        </p:tgtEl>
+                                        <p:attrNameLst>
+                                          <p:attrName>style.visibility</p:attrName>
+                                        </p:attrNameLst>
+                                      </p:cBhvr>
+                                      <p:to>
+                                        <p:strVal val="visible"/>
+                                      </p:to>
+                                    </p:set>
+                                    <p:animEffect transition="in" filter="fade">
+                                      <p:cBhvr>
+                                        <p:cTn id="12" dur="500"/>
+                                        <p:tgtEl>
+                                          <p:spTgt spid="3">
+                                            <p:txEl>
+                                              <p:pRg st="2" end="2"/>
+                                            </p:txEl>
+                                          </p:spTgt>
+                                        </p:tgtEl>
+                                      </p:cBhvr>
+                                    </p:animEffect>
+                                  </p:childTnLst>
+                                </p:cTn>
+                              </p:par>
+                            </p:childTnLst>
+                          </p:cTn>
+                        </p:par>
+                      </p:childTnLst>
+                    </p:cTn>
+                  </p:par>
+                  <p:par>
+                    <p:cTn id="13" fill="hold">
+                      <p:stCondLst>
+                        <p:cond delay="indefinite"/>
+                      </p:stCondLst>
+                      <p:childTnLst>
+                        <p:par>
+                          <p:cTn id="14" fill="hold">
+                            <p:stCondLst>
+                              <p:cond delay="0"/>
+                            </p:stCondLst>
+                            <p:childTnLst>
+                              <p:par>
+                                <p:cTn id="15" presetID="10" presetClass="entr" presetSubtype="0" fill="hold" grpId="0" nodeType="clickEffect">
+                                  <p:stCondLst>
+                                    <p:cond delay="0"/>
+                                  </p:stCondLst>
+                                  <p:childTnLst>
+                                    <p:set>
+                                      <p:cBhvr>
+                                        <p:cTn id="16" dur="1" fill="hold">
+                                          <p:stCondLst>
+                                            <p:cond delay="0"/>
+                                          </p:stCondLst>
+                                        </p:cTn>
+                                        <p:tgtEl>
+                                          <p:spTgt spid="3">
+                                            <p:txEl>
+                                              <p:pRg st="3" end="3"/>
+                                            </p:txEl>
+                                          </p:spTgt>
+                                        </p:tgtEl>
+                                        <p:attrNameLst>
+                                          <p:attrName>style.visibility</p:attrName>
+                                        </p:attrNameLst>
+                                      </p:cBhvr>
+                                      <p:to>
+                                        <p:strVal val="visible"/>
+                                      </p:to>
+                                    </p:set>
+                                    <p:animEffect transition="in" filter="fade">
+                                      <p:cBhvr>
+                                        <p:cTn id="17" dur="500"/>
+                                        <p:tgtEl>
+                                          <p:spTgt spid="3">
+                                            <p:txEl>
+                                              <p:pRg st="3" end="3"/>
+                                            </p:txEl>
+                                          </p:spTgt>
+                                        </p:tgtEl>
+                                      </p:cBhvr>
+                                    </p:animEffect>
+                                  </p:childTnLst>
+                                </p:cTn>
+                              </p:par>
+                            </p:childTnLst>
+                          </p:cTn>
+                        </p:par>
+                      </p:childTnLst>
+                    </p:cTn>
+                  </p:par>
+                  <p:par>
+                    <p:cTn id="18" fill="hold">
+                      <p:stCondLst>
+                        <p:cond delay="indefinite"/>
+                      </p:stCondLst>
+                      <p:childTnLst>
+                        <p:par>
+                          <p:cTn id="19" fill="hold">
+                            <p:stCondLst>
+                              <p:cond delay="0"/>
+                            </p:stCondLst>
+                            <p:childTnLst>
+                              <p:par>
+                                <p:cTn id="20" presetID="10" presetClass="entr" presetSubtype="0" fill="hold" nodeType="clickEffect">
+                                  <p:stCondLst>
+                                    <p:cond delay="0"/>
+                                  </p:stCondLst>
+                                  <p:childTnLst>
+                                    <p:set>
+                                      <p:cBhvr>
+                                        <p:cTn id="21" dur="1" fill="hold">
+                                          <p:stCondLst>
+                                            <p:cond delay="0"/>
+                                          </p:stCondLst>
+                                        </p:cTn>
+                                        <p:tgtEl>
+                                          <p:spTgt spid="16"/>
+                                        </p:tgtEl>
+                                        <p:attrNameLst>
+                                          <p:attrName>style.visibility</p:attrName>
+                                        </p:attrNameLst>
+                                      </p:cBhvr>
+                                      <p:to>
+                                        <p:strVal val="visible"/>
+                                      </p:to>
+                                    </p:set>
+                                    <p:animEffect transition="in" filter="fade">
+                                      <p:cBhvr>
+                                        <p:cTn id="22" dur="500"/>
+                                        <p:tgtEl>
+                                          <p:spTgt spid="16"/>
+                                        </p:tgtEl>
+                                      </p:cBhvr>
+                                    </p:animEffect>
+                                  </p:childTnLst>
+                                </p:cTn>
+                              </p:par>
+                            </p:childTnLst>
+                          </p:cTn>
+                        </p:par>
+                      </p:childTnLst>
+                    </p:cTn>
+                  </p:par>
+                  <p:par>
+                    <p:cTn id="23" fill="hold">
+                      <p:stCondLst>
+                        <p:cond delay="indefinite"/>
+                      </p:stCondLst>
+                      <p:childTnLst>
+                        <p:par>
+                          <p:cTn id="24" fill="hold">
+                            <p:stCondLst>
+                              <p:cond delay="0"/>
+                            </p:stCondLst>
+                            <p:childTnLst>
+                              <p:par>
+                                <p:cTn id="25" presetID="10" presetClass="entr" presetSubtype="0" fill="hold" grpId="0" nodeType="clickEffect">
+                                  <p:stCondLst>
+                                    <p:cond delay="0"/>
+                                  </p:stCondLst>
+                                  <p:childTnLst>
+                                    <p:set>
+                                      <p:cBhvr>
+                                        <p:cTn id="26" dur="1" fill="hold">
+                                          <p:stCondLst>
+                                            <p:cond delay="0"/>
+                                          </p:stCondLst>
+                                        </p:cTn>
+                                        <p:tgtEl>
+                                          <p:spTgt spid="3">
+                                            <p:txEl>
+                                              <p:pRg st="4" end="4"/>
+                                            </p:txEl>
+                                          </p:spTgt>
+                                        </p:tgtEl>
+                                        <p:attrNameLst>
+                                          <p:attrName>style.visibility</p:attrName>
+                                        </p:attrNameLst>
+                                      </p:cBhvr>
+                                      <p:to>
+                                        <p:strVal val="visible"/>
+                                      </p:to>
+                                    </p:set>
+                                    <p:animEffect transition="in" filter="fade">
+                                      <p:cBhvr>
+                                        <p:cTn id="27" dur="500"/>
+                                        <p:tgtEl>
+                                          <p:spTgt spid="3">
+                                            <p:txEl>
+                                              <p:pRg st="4" end="4"/>
+                                            </p:txEl>
+                                          </p:spTgt>
+                                        </p:tgtEl>
+                                      </p:cBhvr>
+                                    </p:animEffect>
+                                  </p:childTnLst>
+                                </p:cTn>
+                              </p:par>
+                            </p:childTnLst>
+                          </p:cTn>
+                        </p:par>
+                      </p:childTnLst>
+                    </p:cTn>
+                  </p:par>
+                  <p:par>
+                    <p:cTn id="28" fill="hold">
+                      <p:stCondLst>
+                        <p:cond delay="indefinite"/>
+                      </p:stCondLst>
+                      <p:childTnLst>
+                        <p:par>
+                          <p:cTn id="29" fill="hold">
+                            <p:stCondLst>
+                              <p:cond delay="0"/>
+                            </p:stCondLst>
+                            <p:childTnLst>
+                              <p:par>
+                                <p:cTn id="30" presetID="10" presetClass="entr" presetSubtype="0" fill="hold" nodeType="clickEffect">
+                                  <p:stCondLst>
+                                    <p:cond delay="0"/>
+                                  </p:stCondLst>
+                                  <p:childTnLst>
+                                    <p:set>
+                                      <p:cBhvr>
+                                        <p:cTn id="31" dur="1" fill="hold">
+                                          <p:stCondLst>
+                                            <p:cond delay="0"/>
+                                          </p:stCondLst>
+                                        </p:cTn>
+                                        <p:tgtEl>
+                                          <p:spTgt spid="17"/>
+                                        </p:tgtEl>
+                                        <p:attrNameLst>
+                                          <p:attrName>style.visibility</p:attrName>
+                                        </p:attrNameLst>
+                                      </p:cBhvr>
+                                      <p:to>
+                                        <p:strVal val="visible"/>
+                                      </p:to>
+                                    </p:set>
+                                    <p:animEffect transition="in" filter="fade">
+                                      <p:cBhvr>
+                                        <p:cTn id="32" dur="500"/>
+                                        <p:tgtEl>
+                                          <p:spTgt spid="17"/>
+                                        </p:tgtEl>
+                                      </p:cBhvr>
+                                    </p:animEffect>
+                                  </p:childTnLst>
+                                </p:cTn>
+                              </p:par>
+                            </p:childTnLst>
+                          </p:cTn>
+                        </p:par>
+                      </p:childTnLst>
+                    </p:cTn>
+                  </p:par>
+                  <p:par>
+                    <p:cTn id="33" fill="hold">
+                      <p:stCondLst>
+                        <p:cond delay="indefinite"/>
+                      </p:stCondLst>
+                      <p:childTnLst>
+                        <p:par>
+                          <p:cTn id="34" fill="hold">
+                            <p:stCondLst>
+                              <p:cond delay="0"/>
+                            </p:stCondLst>
+                            <p:childTnLst>
+                              <p:par>
+                                <p:cTn id="35" presetID="10" presetClass="entr" presetSubtype="0" fill="hold" grpId="0" nodeType="clickEffect">
+                                  <p:stCondLst>
+                                    <p:cond delay="0"/>
+                                  </p:stCondLst>
+                                  <p:childTnLst>
+                                    <p:set>
+                                      <p:cBhvr>
+                                        <p:cTn id="36" dur="1" fill="hold">
+                                          <p:stCondLst>
+                                            <p:cond delay="0"/>
+                                          </p:stCondLst>
+                                        </p:cTn>
+                                        <p:tgtEl>
+                                          <p:spTgt spid="3">
+                                            <p:txEl>
+                                              <p:pRg st="5" end="5"/>
+                                            </p:txEl>
+                                          </p:spTgt>
+                                        </p:tgtEl>
+                                        <p:attrNameLst>
+                                          <p:attrName>style.visibility</p:attrName>
+                                        </p:attrNameLst>
+                                      </p:cBhvr>
+                                      <p:to>
+                                        <p:strVal val="visible"/>
+                                      </p:to>
+                                    </p:set>
+                                    <p:animEffect transition="in" filter="fade">
+                                      <p:cBhvr>
+                                        <p:cTn id="37" dur="500"/>
+                                        <p:tgtEl>
+                                          <p:spTgt spid="3">
+                                            <p:txEl>
+                                              <p:pRg st="5" end="5"/>
+                                            </p:txEl>
+                                          </p:spTgt>
+                                        </p:tgtEl>
+                                      </p:cBhvr>
+                                    </p:animEffect>
+                                  </p:childTnLst>
+                                </p:cTn>
+                              </p:par>
+                            </p:childTnLst>
+                          </p:cTn>
+                        </p:par>
+                      </p:childTnLst>
+                    </p:cTn>
+                  </p:par>
+                  <p:par>
+                    <p:cTn id="38" fill="hold">
+                      <p:stCondLst>
+                        <p:cond delay="indefinite"/>
+                      </p:stCondLst>
+                      <p:childTnLst>
+                        <p:par>
+                          <p:cTn id="39" fill="hold">
+                            <p:stCondLst>
+                              <p:cond delay="0"/>
+                            </p:stCondLst>
+                            <p:childTnLst>
+                              <p:par>
+                                <p:cTn id="40" presetID="10" presetClass="entr" presetSubtype="0" fill="hold" nodeType="clickEffect">
+                                  <p:stCondLst>
+                                    <p:cond delay="0"/>
+                                  </p:stCondLst>
+                                  <p:childTnLst>
+                                    <p:set>
+                                      <p:cBhvr>
+                                        <p:cTn id="41" dur="1" fill="hold">
+                                          <p:stCondLst>
+                                            <p:cond delay="0"/>
+                                          </p:stCondLst>
+                                        </p:cTn>
+                                        <p:tgtEl>
+                                          <p:spTgt spid="18"/>
+                                        </p:tgtEl>
+                                        <p:attrNameLst>
+                                          <p:attrName>style.visibility</p:attrName>
+                                        </p:attrNameLst>
+                                      </p:cBhvr>
+                                      <p:to>
+                                        <p:strVal val="visible"/>
+                                      </p:to>
+                                    </p:set>
+                                    <p:animEffect transition="in" filter="fade">
+                                      <p:cBhvr>
+                                        <p:cTn id="42" dur="500"/>
+                                        <p:tgtEl>
+                                          <p:spTgt spid="18"/>
+                                        </p:tgtEl>
+                                      </p:cBhvr>
+                                    </p:animEffect>
+                                  </p:childTnLst>
+                                </p:cTn>
+                              </p:par>
+                            </p:childTnLst>
+                          </p:cTn>
+                        </p:par>
+                      </p:childTnLst>
+                    </p:cTn>
+                  </p:par>
+                  <p:par>
+                    <p:cTn id="43" fill="hold">
+                      <p:stCondLst>
+                        <p:cond delay="indefinite"/>
+                      </p:stCondLst>
+                      <p:childTnLst>
+                        <p:par>
+                          <p:cTn id="44" fill="hold">
+                            <p:stCondLst>
+                              <p:cond delay="0"/>
+                            </p:stCondLst>
+                            <p:childTnLst>
+                              <p:par>
+                                <p:cTn id="45" presetID="10" presetClass="entr" presetSubtype="0" fill="hold" grpId="0" nodeType="clickEffect">
+                                  <p:stCondLst>
+                                    <p:cond delay="0"/>
+                                  </p:stCondLst>
+                                  <p:childTnLst>
+                                    <p:set>
+                                      <p:cBhvr>
+                                        <p:cTn id="46" dur="1" fill="hold">
+                                          <p:stCondLst>
+                                            <p:cond delay="0"/>
+                                          </p:stCondLst>
+                                        </p:cTn>
+                                        <p:tgtEl>
+                                          <p:spTgt spid="3">
+                                            <p:txEl>
+                                              <p:pRg st="6" end="6"/>
+                                            </p:txEl>
+                                          </p:spTgt>
+                                        </p:tgtEl>
+                                        <p:attrNameLst>
+                                          <p:attrName>style.visibility</p:attrName>
+                                        </p:attrNameLst>
+                                      </p:cBhvr>
+                                      <p:to>
+                                        <p:strVal val="visible"/>
+                                      </p:to>
+                                    </p:set>
+                                    <p:animEffect transition="in" filter="fade">
+                                      <p:cBhvr>
+                                        <p:cTn id="47" dur="500"/>
+                                        <p:tgtEl>
+                                          <p:spTgt spid="3">
+                                            <p:txEl>
+                                              <p:pRg st="6" end="6"/>
+                                            </p:txEl>
+                                          </p:spTgt>
+                                        </p:tgtEl>
+                                      </p:cBhvr>
+                                    </p:animEffect>
+                                  </p:childTnLst>
+                                </p:cTn>
+                              </p:par>
+                            </p:childTnLst>
+                          </p:cTn>
+                        </p:par>
+                      </p:childTnLst>
+                    </p:cTn>
+                  </p:par>
+                  <p:par>
+                    <p:cTn id="48" fill="hold">
+                      <p:stCondLst>
+                        <p:cond delay="indefinite"/>
+                      </p:stCondLst>
+                      <p:childTnLst>
+                        <p:par>
+                          <p:cTn id="49" fill="hold">
+                            <p:stCondLst>
+                              <p:cond delay="0"/>
+                            </p:stCondLst>
+                            <p:childTnLst>
+                              <p:par>
+                                <p:cTn id="50" presetID="10" presetClass="entr" presetSubtype="0" fill="hold" nodeType="clickEffect">
+                                  <p:stCondLst>
+                                    <p:cond delay="0"/>
+                                  </p:stCondLst>
+                                  <p:childTnLst>
+                                    <p:set>
+                                      <p:cBhvr>
+                                        <p:cTn id="51" dur="1" fill="hold">
+                                          <p:stCondLst>
+                                            <p:cond delay="0"/>
+                                          </p:stCondLst>
+                                        </p:cTn>
+                                        <p:tgtEl>
+                                          <p:spTgt spid="19"/>
+                                        </p:tgtEl>
+                                        <p:attrNameLst>
+                                          <p:attrName>style.visibility</p:attrName>
+                                        </p:attrNameLst>
+                                      </p:cBhvr>
+                                      <p:to>
+                                        <p:strVal val="visible"/>
+                                      </p:to>
+                                    </p:set>
+                                    <p:animEffect transition="in" filter="fade">
+                                      <p:cBhvr>
+                                        <p:cTn id="52" dur="500"/>
+                                        <p:tgtEl>
+                                          <p:spTgt spid="19"/>
+                                        </p:tgtEl>
+                                      </p:cBhvr>
+                                    </p:animEffect>
+                                  </p:childTnLst>
+                                </p:cTn>
+                              </p:par>
+                            </p:childTnLst>
+                          </p:cTn>
+                        </p:par>
+                      </p:childTnLst>
+                    </p:cTn>
+                  </p:par>
+                  <p:par>
+                    <p:cTn id="53" fill="hold">
+                      <p:stCondLst>
+                        <p:cond delay="indefinite"/>
+                      </p:stCondLst>
+                      <p:childTnLst>
+                        <p:par>
+                          <p:cTn id="54" fill="hold">
+                            <p:stCondLst>
+                              <p:cond delay="0"/>
+                            </p:stCondLst>
+                            <p:childTnLst>
+                              <p:par>
+                                <p:cTn id="55" presetID="10" presetClass="entr" presetSubtype="0" fill="hold" grpId="0" nodeType="clickEffect">
+                                  <p:stCondLst>
+                                    <p:cond delay="0"/>
+                                  </p:stCondLst>
+                                  <p:childTnLst>
+                                    <p:set>
+                                      <p:cBhvr>
+                                        <p:cTn id="56" dur="1" fill="hold">
+                                          <p:stCondLst>
+                                            <p:cond delay="0"/>
+                                          </p:stCondLst>
+                                        </p:cTn>
+                                        <p:tgtEl>
+                                          <p:spTgt spid="3">
+                                            <p:txEl>
+                                              <p:pRg st="7" end="7"/>
+                                            </p:txEl>
+                                          </p:spTgt>
+                                        </p:tgtEl>
+                                        <p:attrNameLst>
+                                          <p:attrName>style.visibility</p:attrName>
+                                        </p:attrNameLst>
+                                      </p:cBhvr>
+                                      <p:to>
+                                        <p:strVal val="visible"/>
+                                      </p:to>
+                                    </p:set>
+                                    <p:animEffect transition="in" filter="fade">
+                                      <p:cBhvr>
+                                        <p:cTn id="57" dur="500"/>
+                                        <p:tgtEl>
+                                          <p:spTgt spid="3">
+                                            <p:txEl>
+                                              <p:pRg st="7" end="7"/>
+                                            </p:txEl>
+                                          </p:spTgt>
+                                        </p:tgtEl>
+                                      </p:cBhvr>
+                                    </p:animEffect>
+                                  </p:childTnLst>
+                                </p:cTn>
+                              </p:par>
+                            </p:childTnLst>
+                          </p:cTn>
+                        </p:par>
+                      </p:childTnLst>
+                    </p:cTn>
+                  </p:par>
+                  <p:par>
+                    <p:cTn id="58" fill="hold">
+                      <p:stCondLst>
+                        <p:cond delay="indefinite"/>
+                      </p:stCondLst>
+                      <p:childTnLst>
+                        <p:par>
+                          <p:cTn id="59" fill="hold">
+                            <p:stCondLst>
+                              <p:cond delay="0"/>
+                            </p:stCondLst>
+                            <p:childTnLst>
+                              <p:par>
+                                <p:cTn id="60" presetID="10" presetClass="entr" presetSubtype="0" fill="hold" nodeType="clickEffect">
+                                  <p:stCondLst>
+                                    <p:cond delay="0"/>
+                                  </p:stCondLst>
+                                  <p:childTnLst>
+                                    <p:set>
+                                      <p:cBhvr>
+                                        <p:cTn id="61" dur="1" fill="hold">
+                                          <p:stCondLst>
+                                            <p:cond delay="0"/>
+                                          </p:stCondLst>
+                                        </p:cTn>
+                                        <p:tgtEl>
+                                          <p:spTgt spid="20"/>
+                                        </p:tgtEl>
+                                        <p:attrNameLst>
+                                          <p:attrName>style.visibility</p:attrName>
+                                        </p:attrNameLst>
+                                      </p:cBhvr>
+                                      <p:to>
+                                        <p:strVal val="visible"/>
+                                      </p:to>
+                                    </p:set>
+                                    <p:animEffect transition="in" filter="fade">
+                                      <p:cBhvr>
+                                        <p:cTn id="62" dur="500"/>
+                                        <p:tgtEl>
+                                          <p:spTgt spid="20"/>
+                                        </p:tgtEl>
+                                      </p:cBhvr>
+                                    </p:animEffect>
+                                  </p:childTnLst>
+                                </p:cTn>
+                              </p:par>
+                            </p:childTnLst>
+                          </p:cTn>
+                        </p:par>
+                      </p:childTnLst>
+                    </p:cTn>
+                  </p:par>
+                  <p:par>
+                    <p:cTn id="63" fill="hold">
+                      <p:stCondLst>
+                        <p:cond delay="indefinite"/>
+                      </p:stCondLst>
+                      <p:childTnLst>
+                        <p:par>
+                          <p:cTn id="64" fill="hold">
+                            <p:stCondLst>
+                              <p:cond delay="0"/>
+                            </p:stCondLst>
+                            <p:childTnLst>
+                              <p:par>
+                                <p:cTn id="65" presetID="10" presetClass="entr" presetSubtype="0" fill="hold" nodeType="clickEffect">
+                                  <p:stCondLst>
+                                    <p:cond delay="0"/>
+                                  </p:stCondLst>
+                                  <p:childTnLst>
+                                    <p:set>
+                                      <p:cBhvr>
+                                        <p:cTn id="66" dur="1" fill="hold">
+                                          <p:stCondLst>
+                                            <p:cond delay="0"/>
+                                          </p:stCondLst>
+                                        </p:cTn>
+                                        <p:tgtEl>
+                                          <p:spTgt spid="21"/>
+                                        </p:tgtEl>
+                                        <p:attrNameLst>
+                                          <p:attrName>style.visibility</p:attrName>
+                                        </p:attrNameLst>
+                                      </p:cBhvr>
+                                      <p:to>
+                                        <p:strVal val="visible"/>
+                                      </p:to>
+                                    </p:set>
+                                    <p:animEffect transition="in" filter="fade">
+                                      <p:cBhvr>
+                                        <p:cTn id="67" dur="500"/>
+                                        <p:tgtEl>
+                                          <p:spTgt spid="21"/>
+                                        </p:tgtEl>
+                                      </p:cBhvr>
+                                    </p:animEffect>
+                                  </p:childTnLst>
+                                </p:cTn>
+                              </p:par>
+                            </p:childTnLst>
+                          </p:cTn>
+                        </p:par>
+                      </p:childTnLst>
+                    </p:cTn>
+                  </p:par>
+                </p:childTnLst>
+              </p:cTn>
+              <p:prevCondLst>
+                <p:cond evt="onPrev" delay="0">
+                  <p:tgtEl>
+                    <p:sldTgt/>
+                  </p:tgtEl>
+                </p:cond>
+              </p:prevCondLst>
+              <p:nextCondLst>
+                <p:cond evt="onNext" delay="0">
+                  <p:tgtEl>
+                    <p:sldTgt/>
+                  </p:tgtEl>
+                </p:cond>
+              </p:nextCondLst>
+            </p:seq>
+          </p:childTnLst>
+        </p:cTn>
+      </p:par>
+    </p:tnLst>
+    <p:bldLst>
+      <p:bldP spid="3" grpId="0" uiExpand="1" build="p"/>
+    </p:bldLst>
+  </p:timing>
+</p:sld>
+</file>
+
+<file path=ppt/slides/slide5.xml><?xml version="1.0" encoding="utf-8"?>
+<p:sld xmlns:a="http://schemas.openxmlformats.org/drawingml/2006/main" xmlns:r="http://schemas.openxmlformats.org/officeDocument/2006/relationships" xmlns:p="http://schemas.openxmlformats.org/presentationml/2006/main">
+  <p:cSld>
+    <p:spTree>
+      <p:nvGrpSpPr>
+        <p:cNvPr id="1" name=""/>
+        <p:cNvGrpSpPr/>
+        <p:nvPr/>
+      </p:nvGrpSpPr>
+      <p:grpSpPr>
+        <a:xfrm>
+          <a:off x="0" y="0"/>
+          <a:ext cx="0" cy="0"/>
+          <a:chOff x="0" y="0"/>
+          <a:chExt cx="0" cy="0"/>
+        </a:xfrm>
+      </p:grpSpPr>
+      <p:sp>
+        <p:nvSpPr>
+          <p:cNvPr id="2" name="Title 1"/>
+          <p:cNvSpPr>
+            <a:spLocks noGrp="1"/>
+          </p:cNvSpPr>
+          <p:nvPr>
+            <p:ph type="title"/>
+          </p:nvPr>
+        </p:nvSpPr>
+        <p:spPr/>
+        <p:txBody>
+          <a:bodyPr/>
+          <a:lstStyle/>
+          <a:p>
+            <a:r>
+              <a:rPr lang="en-US" dirty="0" smtClean="0"/>
               <a:t>Comparing values for </a:t>
             </a:r>
             <a:r>
@@ -40614,7 +42950,7 @@
 </p:sld>
 </file>
 
-<file path=ppt/slides/slide5.xml><?xml version="1.0" encoding="utf-8"?>
+<file path=ppt/slides/slide6.xml><?xml version="1.0" encoding="utf-8"?>
 <p:sld xmlns:a="http://schemas.openxmlformats.org/drawingml/2006/main" xmlns:r="http://schemas.openxmlformats.org/officeDocument/2006/relationships" xmlns:p="http://schemas.openxmlformats.org/presentationml/2006/main">
   <p:cSld>
     <p:spTree>
@@ -40718,7 +43054,7 @@
 </p:sld>
 </file>
 
-<file path=ppt/slides/slide6.xml><?xml version="1.0" encoding="utf-8"?>
+<file path=ppt/slides/slide7.xml><?xml version="1.0" encoding="utf-8"?>
 <p:sld xmlns:a="http://schemas.openxmlformats.org/drawingml/2006/main" xmlns:r="http://schemas.openxmlformats.org/officeDocument/2006/relationships" xmlns:p="http://schemas.openxmlformats.org/presentationml/2006/main">
   <p:cSld>
     <p:spTree>
@@ -41392,7 +43728,7 @@
 </p:sld>
 </file>
 
-<file path=ppt/slides/slide7.xml><?xml version="1.0" encoding="utf-8"?>
+<file path=ppt/slides/slide8.xml><?xml version="1.0" encoding="utf-8"?>
 <p:sld xmlns:a="http://schemas.openxmlformats.org/drawingml/2006/main" xmlns:r="http://schemas.openxmlformats.org/officeDocument/2006/relationships" xmlns:p="http://schemas.openxmlformats.org/presentationml/2006/main">
   <p:cSld>
     <p:spTree>
@@ -41528,7 +43864,7 @@
 </p:sld>
 </file>
 
-<file path=ppt/slides/slide8.xml><?xml version="1.0" encoding="utf-8"?>
+<file path=ppt/slides/slide9.xml><?xml version="1.0" encoding="utf-8"?>
 <p:sld xmlns:a="http://schemas.openxmlformats.org/drawingml/2006/main" xmlns:r="http://schemas.openxmlformats.org/officeDocument/2006/relationships" xmlns:p="http://schemas.openxmlformats.org/presentationml/2006/main">
   <p:cSld>
     <p:spTree>
@@ -42357,113 +44693,6 @@
     <p:bldLst>
       <p:bldP spid="3" grpId="0" uiExpand="1" build="p"/>
     </p:bldLst>
-  </p:timing>
-</p:sld>
-</file>
-
-<file path=ppt/slides/slide9.xml><?xml version="1.0" encoding="utf-8"?>
-<p:sld xmlns:a="http://schemas.openxmlformats.org/drawingml/2006/main" xmlns:r="http://schemas.openxmlformats.org/officeDocument/2006/relationships" xmlns:p="http://schemas.openxmlformats.org/presentationml/2006/main">
-  <p:cSld>
-    <p:spTree>
-      <p:nvGrpSpPr>
-        <p:cNvPr id="1" name=""/>
-        <p:cNvGrpSpPr/>
-        <p:nvPr/>
-      </p:nvGrpSpPr>
-      <p:grpSpPr>
-        <a:xfrm>
-          <a:off x="0" y="0"/>
-          <a:ext cx="0" cy="0"/>
-          <a:chOff x="0" y="0"/>
-          <a:chExt cx="0" cy="0"/>
-        </a:xfrm>
-      </p:grpSpPr>
-      <p:sp>
-        <p:nvSpPr>
-          <p:cNvPr id="2" name="Title 1"/>
-          <p:cNvSpPr>
-            <a:spLocks noGrp="1"/>
-          </p:cNvSpPr>
-          <p:nvPr>
-            <p:ph type="title"/>
-          </p:nvPr>
-        </p:nvSpPr>
-        <p:spPr/>
-        <p:txBody>
-          <a:bodyPr/>
-          <a:lstStyle/>
-          <a:p>
-            <a:r>
-              <a:rPr lang="en-US" dirty="0"/>
-              <a:t>The </a:t>
-            </a:r>
-            <a:r>
-              <a:rPr lang="en-US" sz="4000" cap="none" dirty="0">
-                <a:solidFill>
-                  <a:schemeClr val="accent1">
-                    <a:lumMod val="20000"/>
-                    <a:lumOff val="80000"/>
-                  </a:schemeClr>
-                </a:solidFill>
-                <a:latin typeface="Consolas" panose="020B0609020204030204" pitchFamily="49" charset="0"/>
-              </a:rPr>
-              <a:t>else</a:t>
-            </a:r>
-            <a:r>
-              <a:rPr lang="en-US" dirty="0"/>
-              <a:t> </a:t>
-            </a:r>
-            <a:r>
-              <a:rPr lang="en-US" dirty="0" smtClean="0"/>
-              <a:t>clause – flowchart</a:t>
-            </a:r>
-            <a:endParaRPr lang="en-US" dirty="0"/>
-          </a:p>
-        </p:txBody>
-      </p:sp>
-      <p:pic>
-        <p:nvPicPr>
-          <p:cNvPr id="5" name="Picture 4"/>
-          <p:cNvPicPr>
-            <a:picLocks noChangeAspect="1"/>
-          </p:cNvPicPr>
-          <p:nvPr/>
-        </p:nvPicPr>
-        <p:blipFill>
-          <a:blip r:embed="rId3"/>
-          <a:stretch>
-            <a:fillRect/>
-          </a:stretch>
-        </p:blipFill>
-        <p:spPr>
-          <a:xfrm>
-            <a:off x="1663110" y="1485900"/>
-            <a:ext cx="8865779" cy="5029200"/>
-          </a:xfrm>
-          <a:prstGeom prst="rect">
-            <a:avLst/>
-          </a:prstGeom>
-        </p:spPr>
-      </p:pic>
-    </p:spTree>
-    <p:extLst>
-      <p:ext uri="{BB962C8B-B14F-4D97-AF65-F5344CB8AC3E}">
-        <p14:creationId xmlns:p14="http://schemas.microsoft.com/office/powerpoint/2010/main" val="716826872"/>
-      </p:ext>
-    </p:extLst>
-  </p:cSld>
-  <p:clrMapOvr>
-    <a:masterClrMapping/>
-  </p:clrMapOvr>
-  <p:transition>
-    <p:fade/>
-  </p:transition>
-  <p:timing>
-    <p:tnLst>
-      <p:par>
-        <p:cTn id="1" dur="indefinite" restart="never" nodeType="tmRoot"/>
-      </p:par>
-    </p:tnLst>
   </p:timing>
 </p:sld>
 </file>

</xml_diff>

<commit_message>
f22 week 5 updates
</commit_message>
<xml_diff>
--- a/Week05/Conditionals.pptx
+++ b/Week05/Conditionals.pptx
@@ -230,7 +230,7 @@
           <a:p>
             <a:fld id="{19104133-B5B0-4351-8158-4F0E5EB1E2BF}" type="datetimeFigureOut">
               <a:rPr lang="en-US" smtClean="0"/>
-              <a:t>6/16/2021</a:t>
+              <a:t>9/6/2022</a:t>
             </a:fld>
             <a:endParaRPr lang="en-US"/>
           </a:p>
@@ -2845,7 +2845,7 @@
             <a:fld id="{1C2D31DE-C454-491C-B5C3-F097855E3DF7}" type="datetime4">
               <a:rPr lang="en-US" smtClean="0"/>
               <a:pPr/>
-              <a:t>June 16, 2021</a:t>
+              <a:t>September 6, 2022</a:t>
             </a:fld>
             <a:endParaRPr lang="en-US" dirty="0"/>
           </a:p>
@@ -6237,7 +6237,7 @@
           <a:p>
             <a:fld id="{5958763E-B898-436D-883D-03711491D54A}" type="datetimeFigureOut">
               <a:rPr lang="en-US" smtClean="0"/>
-              <a:t>6/16/2021</a:t>
+              <a:t>9/6/2022</a:t>
             </a:fld>
             <a:endParaRPr lang="en-US"/>
           </a:p>
@@ -6430,7 +6430,7 @@
           <a:p>
             <a:fld id="{5958763E-B898-436D-883D-03711491D54A}" type="datetimeFigureOut">
               <a:rPr lang="en-US" smtClean="0"/>
-              <a:t>6/16/2021</a:t>
+              <a:t>9/6/2022</a:t>
             </a:fld>
             <a:endParaRPr lang="en-US"/>
           </a:p>
@@ -6680,7 +6680,7 @@
           <a:p>
             <a:fld id="{5958763E-B898-436D-883D-03711491D54A}" type="datetimeFigureOut">
               <a:rPr lang="en-US" smtClean="0"/>
-              <a:t>6/16/2021</a:t>
+              <a:t>9/6/2022</a:t>
             </a:fld>
             <a:endParaRPr lang="en-US"/>
           </a:p>
@@ -7028,7 +7028,7 @@
           <a:p>
             <a:fld id="{5958763E-B898-436D-883D-03711491D54A}" type="datetimeFigureOut">
               <a:rPr lang="en-US" smtClean="0"/>
-              <a:t>6/16/2021</a:t>
+              <a:t>9/6/2022</a:t>
             </a:fld>
             <a:endParaRPr lang="en-US"/>
           </a:p>
@@ -7444,7 +7444,7 @@
           <a:p>
             <a:fld id="{5958763E-B898-436D-883D-03711491D54A}" type="datetimeFigureOut">
               <a:rPr lang="en-US" smtClean="0"/>
-              <a:t>6/16/2021</a:t>
+              <a:t>9/6/2022</a:t>
             </a:fld>
             <a:endParaRPr lang="en-US"/>
           </a:p>
@@ -7945,7 +7945,7 @@
           <a:p>
             <a:fld id="{5958763E-B898-436D-883D-03711491D54A}" type="datetimeFigureOut">
               <a:rPr lang="en-US" smtClean="0"/>
-              <a:t>6/16/2021</a:t>
+              <a:t>9/6/2022</a:t>
             </a:fld>
             <a:endParaRPr lang="en-US"/>
           </a:p>
@@ -8396,7 +8396,7 @@
           <a:p>
             <a:fld id="{5958763E-B898-436D-883D-03711491D54A}" type="datetimeFigureOut">
               <a:rPr lang="en-US" smtClean="0"/>
-              <a:t>6/16/2021</a:t>
+              <a:t>9/6/2022</a:t>
             </a:fld>
             <a:endParaRPr lang="en-US"/>
           </a:p>
@@ -9007,7 +9007,7 @@
           <a:p>
             <a:fld id="{5958763E-B898-436D-883D-03711491D54A}" type="datetimeFigureOut">
               <a:rPr lang="en-US" smtClean="0"/>
-              <a:t>6/16/2021</a:t>
+              <a:t>9/6/2022</a:t>
             </a:fld>
             <a:endParaRPr lang="en-US"/>
           </a:p>
@@ -9778,7 +9778,7 @@
           <a:p>
             <a:fld id="{5958763E-B898-436D-883D-03711491D54A}" type="datetimeFigureOut">
               <a:rPr lang="en-US" smtClean="0"/>
-              <a:t>6/16/2021</a:t>
+              <a:t>9/6/2022</a:t>
             </a:fld>
             <a:endParaRPr lang="en-US"/>
           </a:p>
@@ -9882,7 +9882,7 @@
           <a:p>
             <a:fld id="{5958763E-B898-436D-883D-03711491D54A}" type="datetimeFigureOut">
               <a:rPr lang="en-US" smtClean="0"/>
-              <a:t>6/16/2021</a:t>
+              <a:t>9/6/2022</a:t>
             </a:fld>
             <a:endParaRPr lang="en-US"/>
           </a:p>
@@ -10209,7 +10209,7 @@
             <a:fld id="{1C2D31DE-C454-491C-B5C3-F097855E3DF7}" type="datetime4">
               <a:rPr lang="en-US" smtClean="0"/>
               <a:pPr/>
-              <a:t>June 16, 2021</a:t>
+              <a:t>September 6, 2022</a:t>
             </a:fld>
             <a:endParaRPr lang="en-US" dirty="0"/>
           </a:p>
@@ -13361,7 +13361,7 @@
           <a:p>
             <a:fld id="{5958763E-B898-436D-883D-03711491D54A}" type="datetimeFigureOut">
               <a:rPr lang="en-US" smtClean="0"/>
-              <a:t>6/16/2021</a:t>
+              <a:t>9/6/2022</a:t>
             </a:fld>
             <a:endParaRPr lang="en-US"/>
           </a:p>
@@ -13485,7 +13485,7 @@
           <a:p>
             <a:fld id="{5958763E-B898-436D-883D-03711491D54A}" type="datetimeFigureOut">
               <a:rPr lang="en-US" smtClean="0"/>
-              <a:t>6/16/2021</a:t>
+              <a:t>9/6/2022</a:t>
             </a:fld>
             <a:endParaRPr lang="en-US"/>
           </a:p>
@@ -13609,7 +13609,7 @@
           <a:p>
             <a:fld id="{5958763E-B898-436D-883D-03711491D54A}" type="datetimeFigureOut">
               <a:rPr lang="en-US" smtClean="0"/>
-              <a:t>6/16/2021</a:t>
+              <a:t>9/6/2022</a:t>
             </a:fld>
             <a:endParaRPr lang="en-US"/>
           </a:p>
@@ -13733,7 +13733,7 @@
           <a:p>
             <a:fld id="{5958763E-B898-436D-883D-03711491D54A}" type="datetimeFigureOut">
               <a:rPr lang="en-US" smtClean="0"/>
-              <a:t>6/16/2021</a:t>
+              <a:t>9/6/2022</a:t>
             </a:fld>
             <a:endParaRPr lang="en-US"/>
           </a:p>
@@ -13857,7 +13857,7 @@
           <a:p>
             <a:fld id="{5958763E-B898-436D-883D-03711491D54A}" type="datetimeFigureOut">
               <a:rPr lang="en-US" smtClean="0"/>
-              <a:t>6/16/2021</a:t>
+              <a:t>9/6/2022</a:t>
             </a:fld>
             <a:endParaRPr lang="en-US"/>
           </a:p>
@@ -13981,7 +13981,7 @@
           <a:p>
             <a:fld id="{5958763E-B898-436D-883D-03711491D54A}" type="datetimeFigureOut">
               <a:rPr lang="en-US" smtClean="0"/>
-              <a:t>6/16/2021</a:t>
+              <a:t>9/6/2022</a:t>
             </a:fld>
             <a:endParaRPr lang="en-US"/>
           </a:p>
@@ -14105,7 +14105,7 @@
           <a:p>
             <a:fld id="{5958763E-B898-436D-883D-03711491D54A}" type="datetimeFigureOut">
               <a:rPr lang="en-US" smtClean="0"/>
-              <a:t>6/16/2021</a:t>
+              <a:t>9/6/2022</a:t>
             </a:fld>
             <a:endParaRPr lang="en-US"/>
           </a:p>
@@ -14229,7 +14229,7 @@
           <a:p>
             <a:fld id="{5958763E-B898-436D-883D-03711491D54A}" type="datetimeFigureOut">
               <a:rPr lang="en-US" smtClean="0"/>
-              <a:t>6/16/2021</a:t>
+              <a:t>9/6/2022</a:t>
             </a:fld>
             <a:endParaRPr lang="en-US"/>
           </a:p>
@@ -14362,7 +14362,7 @@
           <a:p>
             <a:fld id="{5958763E-B898-436D-883D-03711491D54A}" type="datetimeFigureOut">
               <a:rPr lang="en-US" smtClean="0"/>
-              <a:t>6/16/2021</a:t>
+              <a:t>9/6/2022</a:t>
             </a:fld>
             <a:endParaRPr lang="en-US"/>
           </a:p>
@@ -17701,7 +17701,7 @@
             <a:fld id="{1C2D31DE-C454-491C-B5C3-F097855E3DF7}" type="datetime4">
               <a:rPr lang="en-US" smtClean="0"/>
               <a:pPr/>
-              <a:t>June 16, 2021</a:t>
+              <a:t>September 6, 2022</a:t>
             </a:fld>
             <a:endParaRPr lang="en-US" dirty="0"/>
           </a:p>
@@ -29937,7 +29937,7 @@
           <a:p>
             <a:fld id="{5958763E-B898-436D-883D-03711491D54A}" type="datetimeFigureOut">
               <a:rPr lang="en-US" smtClean="0"/>
-              <a:t>6/16/2021</a:t>
+              <a:t>9/6/2022</a:t>
             </a:fld>
             <a:endParaRPr lang="en-US"/>
           </a:p>
@@ -30339,7 +30339,7 @@
           <a:p>
             <a:fld id="{5958763E-B898-436D-883D-03711491D54A}" type="datetimeFigureOut">
               <a:rPr lang="en-US" smtClean="0"/>
-              <a:t>6/16/2021</a:t>
+              <a:t>9/6/2022</a:t>
             </a:fld>
             <a:endParaRPr lang="en-US"/>
           </a:p>
@@ -30633,7 +30633,7 @@
           <a:p>
             <a:fld id="{5958763E-B898-436D-883D-03711491D54A}" type="datetimeFigureOut">
               <a:rPr lang="en-US" smtClean="0"/>
-              <a:t>6/16/2021</a:t>
+              <a:t>9/6/2022</a:t>
             </a:fld>
             <a:endParaRPr lang="en-US"/>
           </a:p>
@@ -30834,7 +30834,7 @@
           <a:p>
             <a:fld id="{5958763E-B898-436D-883D-03711491D54A}" type="datetimeFigureOut">
               <a:rPr lang="en-US" smtClean="0"/>
-              <a:t>6/16/2021</a:t>
+              <a:t>9/6/2022</a:t>
             </a:fld>
             <a:endParaRPr lang="en-US"/>
           </a:p>
@@ -31095,7 +31095,7 @@
           <a:p>
             <a:fld id="{5958763E-B898-436D-883D-03711491D54A}" type="datetimeFigureOut">
               <a:rPr lang="en-US" smtClean="0"/>
-              <a:t>6/16/2021</a:t>
+              <a:t>9/6/2022</a:t>
             </a:fld>
             <a:endParaRPr lang="en-US"/>
           </a:p>
@@ -31603,7 +31603,7 @@
           <a:p>
             <a:fld id="{5958763E-B898-436D-883D-03711491D54A}" type="datetimeFigureOut">
               <a:rPr lang="en-US" smtClean="0"/>
-              <a:t>6/16/2021</a:t>
+              <a:t>9/6/2022</a:t>
             </a:fld>
             <a:endParaRPr lang="en-US"/>
           </a:p>
@@ -32082,7 +32082,7 @@
           <a:p>
             <a:fld id="{5958763E-B898-436D-883D-03711491D54A}" type="datetimeFigureOut">
               <a:rPr lang="en-US" smtClean="0"/>
-              <a:t>6/16/2021</a:t>
+              <a:t>9/6/2022</a:t>
             </a:fld>
             <a:endParaRPr lang="en-US"/>
           </a:p>
@@ -32901,7 +32901,7 @@
           <a:p>
             <a:fld id="{5958763E-B898-436D-883D-03711491D54A}" type="datetimeFigureOut">
               <a:rPr lang="en-US" smtClean="0"/>
-              <a:t>6/16/2021</a:t>
+              <a:t>9/6/2022</a:t>
             </a:fld>
             <a:endParaRPr lang="en-US"/>
           </a:p>
@@ -33102,7 +33102,7 @@
           <a:p>
             <a:fld id="{5958763E-B898-436D-883D-03711491D54A}" type="datetimeFigureOut">
               <a:rPr lang="en-US" smtClean="0"/>
-              <a:t>6/16/2021</a:t>
+              <a:t>9/6/2022</a:t>
             </a:fld>
             <a:endParaRPr lang="en-US"/>
           </a:p>
@@ -33437,7 +33437,7 @@
           <a:p>
             <a:fld id="{5958763E-B898-436D-883D-03711491D54A}" type="datetimeFigureOut">
               <a:rPr lang="en-US" smtClean="0"/>
-              <a:t>6/16/2021</a:t>
+              <a:t>9/6/2022</a:t>
             </a:fld>
             <a:endParaRPr lang="en-US"/>
           </a:p>
@@ -33667,7 +33667,7 @@
           <a:p>
             <a:fld id="{5958763E-B898-436D-883D-03711491D54A}" type="datetimeFigureOut">
               <a:rPr lang="en-US" smtClean="0"/>
-              <a:t>6/16/2021</a:t>
+              <a:t>9/6/2022</a:t>
             </a:fld>
             <a:endParaRPr lang="en-US"/>
           </a:p>
@@ -33911,7 +33911,7 @@
           <a:p>
             <a:fld id="{5958763E-B898-436D-883D-03711491D54A}" type="datetimeFigureOut">
               <a:rPr lang="en-US" smtClean="0"/>
-              <a:t>6/16/2021</a:t>
+              <a:t>9/6/2022</a:t>
             </a:fld>
             <a:endParaRPr lang="en-US"/>
           </a:p>
@@ -40247,13 +40247,13 @@
               <a:buNone/>
             </a:pPr>
             <a:r>
-              <a:rPr lang="en-US" sz="7200" dirty="0" err="1">
+              <a:rPr lang="en-US" sz="7200" dirty="0">
                 <a:solidFill>
                   <a:srgbClr val="0000FF"/>
                 </a:solidFill>
                 <a:latin typeface="Consolas" panose="020B0609020204030204" pitchFamily="49" charset="0"/>
               </a:rPr>
-              <a:t>var</a:t>
+              <a:t>let</a:t>
             </a:r>
             <a:r>
               <a:rPr lang="en-US" sz="7200" dirty="0">
@@ -40530,13 +40530,13 @@
               <a:buNone/>
             </a:pPr>
             <a:r>
-              <a:rPr lang="en-US" sz="7200" dirty="0" err="1">
+              <a:rPr lang="en-US" sz="7200" dirty="0">
                 <a:solidFill>
                   <a:srgbClr val="0000FF"/>
                 </a:solidFill>
                 <a:latin typeface="Consolas" panose="020B0609020204030204" pitchFamily="49" charset="0"/>
               </a:rPr>
-              <a:t>var</a:t>
+              <a:t>let</a:t>
             </a:r>
             <a:r>
               <a:rPr lang="en-US" sz="7200" dirty="0">
@@ -42883,13 +42883,13 @@
           <a:p>
             <a:pPr lvl="1"/>
             <a:r>
-              <a:rPr lang="en-US" dirty="0" err="1">
+              <a:rPr lang="en-US" dirty="0">
                 <a:solidFill>
                   <a:srgbClr val="0000FF"/>
                 </a:solidFill>
                 <a:latin typeface="Consolas" panose="020B0609020204030204" pitchFamily="49" charset="0"/>
               </a:rPr>
-              <a:t>var</a:t>
+              <a:t>let</a:t>
             </a:r>
             <a:r>
               <a:rPr lang="en-US" dirty="0">
@@ -42934,13 +42934,13 @@
           <a:p>
             <a:pPr lvl="1"/>
             <a:r>
-              <a:rPr lang="en-US" dirty="0" err="1">
+              <a:rPr lang="en-US" dirty="0">
                 <a:solidFill>
                   <a:srgbClr val="0000FF"/>
                 </a:solidFill>
                 <a:latin typeface="Consolas" panose="020B0609020204030204" pitchFamily="49" charset="0"/>
               </a:rPr>
-              <a:t>var</a:t>
+              <a:t>let</a:t>
             </a:r>
             <a:r>
               <a:rPr lang="en-US" dirty="0">
@@ -43006,7 +43006,7 @@
                 </a:solidFill>
                 <a:latin typeface="Consolas" panose="020B0609020204030204" pitchFamily="49" charset="0"/>
               </a:rPr>
-              <a:t>var</a:t>
+              <a:t>let</a:t>
             </a:r>
             <a:r>
               <a:rPr lang="en-US" dirty="0">
@@ -43045,7 +43045,7 @@
                 </a:solidFill>
                 <a:latin typeface="Consolas" panose="020B0609020204030204" pitchFamily="49" charset="0"/>
               </a:rPr>
-              <a:t>var</a:t>
+              <a:t>let</a:t>
             </a:r>
             <a:r>
               <a:rPr lang="en-US" dirty="0">

</xml_diff>

<commit_message>
Update gitbook 2022-09-06 20:45:35
</commit_message>
<xml_diff>
--- a/Week05/Conditionals.pptx
+++ b/Week05/Conditionals.pptx
@@ -230,7 +230,7 @@
           <a:p>
             <a:fld id="{19104133-B5B0-4351-8158-4F0E5EB1E2BF}" type="datetimeFigureOut">
               <a:rPr lang="en-US" smtClean="0"/>
-              <a:t>6/16/2021</a:t>
+              <a:t>9/6/2022</a:t>
             </a:fld>
             <a:endParaRPr lang="en-US"/>
           </a:p>
@@ -2845,7 +2845,7 @@
             <a:fld id="{1C2D31DE-C454-491C-B5C3-F097855E3DF7}" type="datetime4">
               <a:rPr lang="en-US" smtClean="0"/>
               <a:pPr/>
-              <a:t>June 16, 2021</a:t>
+              <a:t>September 6, 2022</a:t>
             </a:fld>
             <a:endParaRPr lang="en-US" dirty="0"/>
           </a:p>
@@ -6237,7 +6237,7 @@
           <a:p>
             <a:fld id="{5958763E-B898-436D-883D-03711491D54A}" type="datetimeFigureOut">
               <a:rPr lang="en-US" smtClean="0"/>
-              <a:t>6/16/2021</a:t>
+              <a:t>9/6/2022</a:t>
             </a:fld>
             <a:endParaRPr lang="en-US"/>
           </a:p>
@@ -6430,7 +6430,7 @@
           <a:p>
             <a:fld id="{5958763E-B898-436D-883D-03711491D54A}" type="datetimeFigureOut">
               <a:rPr lang="en-US" smtClean="0"/>
-              <a:t>6/16/2021</a:t>
+              <a:t>9/6/2022</a:t>
             </a:fld>
             <a:endParaRPr lang="en-US"/>
           </a:p>
@@ -6680,7 +6680,7 @@
           <a:p>
             <a:fld id="{5958763E-B898-436D-883D-03711491D54A}" type="datetimeFigureOut">
               <a:rPr lang="en-US" smtClean="0"/>
-              <a:t>6/16/2021</a:t>
+              <a:t>9/6/2022</a:t>
             </a:fld>
             <a:endParaRPr lang="en-US"/>
           </a:p>
@@ -7028,7 +7028,7 @@
           <a:p>
             <a:fld id="{5958763E-B898-436D-883D-03711491D54A}" type="datetimeFigureOut">
               <a:rPr lang="en-US" smtClean="0"/>
-              <a:t>6/16/2021</a:t>
+              <a:t>9/6/2022</a:t>
             </a:fld>
             <a:endParaRPr lang="en-US"/>
           </a:p>
@@ -7444,7 +7444,7 @@
           <a:p>
             <a:fld id="{5958763E-B898-436D-883D-03711491D54A}" type="datetimeFigureOut">
               <a:rPr lang="en-US" smtClean="0"/>
-              <a:t>6/16/2021</a:t>
+              <a:t>9/6/2022</a:t>
             </a:fld>
             <a:endParaRPr lang="en-US"/>
           </a:p>
@@ -7945,7 +7945,7 @@
           <a:p>
             <a:fld id="{5958763E-B898-436D-883D-03711491D54A}" type="datetimeFigureOut">
               <a:rPr lang="en-US" smtClean="0"/>
-              <a:t>6/16/2021</a:t>
+              <a:t>9/6/2022</a:t>
             </a:fld>
             <a:endParaRPr lang="en-US"/>
           </a:p>
@@ -8396,7 +8396,7 @@
           <a:p>
             <a:fld id="{5958763E-B898-436D-883D-03711491D54A}" type="datetimeFigureOut">
               <a:rPr lang="en-US" smtClean="0"/>
-              <a:t>6/16/2021</a:t>
+              <a:t>9/6/2022</a:t>
             </a:fld>
             <a:endParaRPr lang="en-US"/>
           </a:p>
@@ -9007,7 +9007,7 @@
           <a:p>
             <a:fld id="{5958763E-B898-436D-883D-03711491D54A}" type="datetimeFigureOut">
               <a:rPr lang="en-US" smtClean="0"/>
-              <a:t>6/16/2021</a:t>
+              <a:t>9/6/2022</a:t>
             </a:fld>
             <a:endParaRPr lang="en-US"/>
           </a:p>
@@ -9778,7 +9778,7 @@
           <a:p>
             <a:fld id="{5958763E-B898-436D-883D-03711491D54A}" type="datetimeFigureOut">
               <a:rPr lang="en-US" smtClean="0"/>
-              <a:t>6/16/2021</a:t>
+              <a:t>9/6/2022</a:t>
             </a:fld>
             <a:endParaRPr lang="en-US"/>
           </a:p>
@@ -9882,7 +9882,7 @@
           <a:p>
             <a:fld id="{5958763E-B898-436D-883D-03711491D54A}" type="datetimeFigureOut">
               <a:rPr lang="en-US" smtClean="0"/>
-              <a:t>6/16/2021</a:t>
+              <a:t>9/6/2022</a:t>
             </a:fld>
             <a:endParaRPr lang="en-US"/>
           </a:p>
@@ -10209,7 +10209,7 @@
             <a:fld id="{1C2D31DE-C454-491C-B5C3-F097855E3DF7}" type="datetime4">
               <a:rPr lang="en-US" smtClean="0"/>
               <a:pPr/>
-              <a:t>June 16, 2021</a:t>
+              <a:t>September 6, 2022</a:t>
             </a:fld>
             <a:endParaRPr lang="en-US" dirty="0"/>
           </a:p>
@@ -13361,7 +13361,7 @@
           <a:p>
             <a:fld id="{5958763E-B898-436D-883D-03711491D54A}" type="datetimeFigureOut">
               <a:rPr lang="en-US" smtClean="0"/>
-              <a:t>6/16/2021</a:t>
+              <a:t>9/6/2022</a:t>
             </a:fld>
             <a:endParaRPr lang="en-US"/>
           </a:p>
@@ -13485,7 +13485,7 @@
           <a:p>
             <a:fld id="{5958763E-B898-436D-883D-03711491D54A}" type="datetimeFigureOut">
               <a:rPr lang="en-US" smtClean="0"/>
-              <a:t>6/16/2021</a:t>
+              <a:t>9/6/2022</a:t>
             </a:fld>
             <a:endParaRPr lang="en-US"/>
           </a:p>
@@ -13609,7 +13609,7 @@
           <a:p>
             <a:fld id="{5958763E-B898-436D-883D-03711491D54A}" type="datetimeFigureOut">
               <a:rPr lang="en-US" smtClean="0"/>
-              <a:t>6/16/2021</a:t>
+              <a:t>9/6/2022</a:t>
             </a:fld>
             <a:endParaRPr lang="en-US"/>
           </a:p>
@@ -13733,7 +13733,7 @@
           <a:p>
             <a:fld id="{5958763E-B898-436D-883D-03711491D54A}" type="datetimeFigureOut">
               <a:rPr lang="en-US" smtClean="0"/>
-              <a:t>6/16/2021</a:t>
+              <a:t>9/6/2022</a:t>
             </a:fld>
             <a:endParaRPr lang="en-US"/>
           </a:p>
@@ -13857,7 +13857,7 @@
           <a:p>
             <a:fld id="{5958763E-B898-436D-883D-03711491D54A}" type="datetimeFigureOut">
               <a:rPr lang="en-US" smtClean="0"/>
-              <a:t>6/16/2021</a:t>
+              <a:t>9/6/2022</a:t>
             </a:fld>
             <a:endParaRPr lang="en-US"/>
           </a:p>
@@ -13981,7 +13981,7 @@
           <a:p>
             <a:fld id="{5958763E-B898-436D-883D-03711491D54A}" type="datetimeFigureOut">
               <a:rPr lang="en-US" smtClean="0"/>
-              <a:t>6/16/2021</a:t>
+              <a:t>9/6/2022</a:t>
             </a:fld>
             <a:endParaRPr lang="en-US"/>
           </a:p>
@@ -14105,7 +14105,7 @@
           <a:p>
             <a:fld id="{5958763E-B898-436D-883D-03711491D54A}" type="datetimeFigureOut">
               <a:rPr lang="en-US" smtClean="0"/>
-              <a:t>6/16/2021</a:t>
+              <a:t>9/6/2022</a:t>
             </a:fld>
             <a:endParaRPr lang="en-US"/>
           </a:p>
@@ -14229,7 +14229,7 @@
           <a:p>
             <a:fld id="{5958763E-B898-436D-883D-03711491D54A}" type="datetimeFigureOut">
               <a:rPr lang="en-US" smtClean="0"/>
-              <a:t>6/16/2021</a:t>
+              <a:t>9/6/2022</a:t>
             </a:fld>
             <a:endParaRPr lang="en-US"/>
           </a:p>
@@ -14362,7 +14362,7 @@
           <a:p>
             <a:fld id="{5958763E-B898-436D-883D-03711491D54A}" type="datetimeFigureOut">
               <a:rPr lang="en-US" smtClean="0"/>
-              <a:t>6/16/2021</a:t>
+              <a:t>9/6/2022</a:t>
             </a:fld>
             <a:endParaRPr lang="en-US"/>
           </a:p>
@@ -17701,7 +17701,7 @@
             <a:fld id="{1C2D31DE-C454-491C-B5C3-F097855E3DF7}" type="datetime4">
               <a:rPr lang="en-US" smtClean="0"/>
               <a:pPr/>
-              <a:t>June 16, 2021</a:t>
+              <a:t>September 6, 2022</a:t>
             </a:fld>
             <a:endParaRPr lang="en-US" dirty="0"/>
           </a:p>
@@ -29937,7 +29937,7 @@
           <a:p>
             <a:fld id="{5958763E-B898-436D-883D-03711491D54A}" type="datetimeFigureOut">
               <a:rPr lang="en-US" smtClean="0"/>
-              <a:t>6/16/2021</a:t>
+              <a:t>9/6/2022</a:t>
             </a:fld>
             <a:endParaRPr lang="en-US"/>
           </a:p>
@@ -30339,7 +30339,7 @@
           <a:p>
             <a:fld id="{5958763E-B898-436D-883D-03711491D54A}" type="datetimeFigureOut">
               <a:rPr lang="en-US" smtClean="0"/>
-              <a:t>6/16/2021</a:t>
+              <a:t>9/6/2022</a:t>
             </a:fld>
             <a:endParaRPr lang="en-US"/>
           </a:p>
@@ -30633,7 +30633,7 @@
           <a:p>
             <a:fld id="{5958763E-B898-436D-883D-03711491D54A}" type="datetimeFigureOut">
               <a:rPr lang="en-US" smtClean="0"/>
-              <a:t>6/16/2021</a:t>
+              <a:t>9/6/2022</a:t>
             </a:fld>
             <a:endParaRPr lang="en-US"/>
           </a:p>
@@ -30834,7 +30834,7 @@
           <a:p>
             <a:fld id="{5958763E-B898-436D-883D-03711491D54A}" type="datetimeFigureOut">
               <a:rPr lang="en-US" smtClean="0"/>
-              <a:t>6/16/2021</a:t>
+              <a:t>9/6/2022</a:t>
             </a:fld>
             <a:endParaRPr lang="en-US"/>
           </a:p>
@@ -31095,7 +31095,7 @@
           <a:p>
             <a:fld id="{5958763E-B898-436D-883D-03711491D54A}" type="datetimeFigureOut">
               <a:rPr lang="en-US" smtClean="0"/>
-              <a:t>6/16/2021</a:t>
+              <a:t>9/6/2022</a:t>
             </a:fld>
             <a:endParaRPr lang="en-US"/>
           </a:p>
@@ -31603,7 +31603,7 @@
           <a:p>
             <a:fld id="{5958763E-B898-436D-883D-03711491D54A}" type="datetimeFigureOut">
               <a:rPr lang="en-US" smtClean="0"/>
-              <a:t>6/16/2021</a:t>
+              <a:t>9/6/2022</a:t>
             </a:fld>
             <a:endParaRPr lang="en-US"/>
           </a:p>
@@ -32082,7 +32082,7 @@
           <a:p>
             <a:fld id="{5958763E-B898-436D-883D-03711491D54A}" type="datetimeFigureOut">
               <a:rPr lang="en-US" smtClean="0"/>
-              <a:t>6/16/2021</a:t>
+              <a:t>9/6/2022</a:t>
             </a:fld>
             <a:endParaRPr lang="en-US"/>
           </a:p>
@@ -32901,7 +32901,7 @@
           <a:p>
             <a:fld id="{5958763E-B898-436D-883D-03711491D54A}" type="datetimeFigureOut">
               <a:rPr lang="en-US" smtClean="0"/>
-              <a:t>6/16/2021</a:t>
+              <a:t>9/6/2022</a:t>
             </a:fld>
             <a:endParaRPr lang="en-US"/>
           </a:p>
@@ -33102,7 +33102,7 @@
           <a:p>
             <a:fld id="{5958763E-B898-436D-883D-03711491D54A}" type="datetimeFigureOut">
               <a:rPr lang="en-US" smtClean="0"/>
-              <a:t>6/16/2021</a:t>
+              <a:t>9/6/2022</a:t>
             </a:fld>
             <a:endParaRPr lang="en-US"/>
           </a:p>
@@ -33437,7 +33437,7 @@
           <a:p>
             <a:fld id="{5958763E-B898-436D-883D-03711491D54A}" type="datetimeFigureOut">
               <a:rPr lang="en-US" smtClean="0"/>
-              <a:t>6/16/2021</a:t>
+              <a:t>9/6/2022</a:t>
             </a:fld>
             <a:endParaRPr lang="en-US"/>
           </a:p>
@@ -33667,7 +33667,7 @@
           <a:p>
             <a:fld id="{5958763E-B898-436D-883D-03711491D54A}" type="datetimeFigureOut">
               <a:rPr lang="en-US" smtClean="0"/>
-              <a:t>6/16/2021</a:t>
+              <a:t>9/6/2022</a:t>
             </a:fld>
             <a:endParaRPr lang="en-US"/>
           </a:p>
@@ -33911,7 +33911,7 @@
           <a:p>
             <a:fld id="{5958763E-B898-436D-883D-03711491D54A}" type="datetimeFigureOut">
               <a:rPr lang="en-US" smtClean="0"/>
-              <a:t>6/16/2021</a:t>
+              <a:t>9/6/2022</a:t>
             </a:fld>
             <a:endParaRPr lang="en-US"/>
           </a:p>
@@ -40247,13 +40247,13 @@
               <a:buNone/>
             </a:pPr>
             <a:r>
-              <a:rPr lang="en-US" sz="7200" dirty="0" err="1">
+              <a:rPr lang="en-US" sz="7200" dirty="0">
                 <a:solidFill>
                   <a:srgbClr val="0000FF"/>
                 </a:solidFill>
                 <a:latin typeface="Consolas" panose="020B0609020204030204" pitchFamily="49" charset="0"/>
               </a:rPr>
-              <a:t>var</a:t>
+              <a:t>let</a:t>
             </a:r>
             <a:r>
               <a:rPr lang="en-US" sz="7200" dirty="0">
@@ -40530,13 +40530,13 @@
               <a:buNone/>
             </a:pPr>
             <a:r>
-              <a:rPr lang="en-US" sz="7200" dirty="0" err="1">
+              <a:rPr lang="en-US" sz="7200" dirty="0">
                 <a:solidFill>
                   <a:srgbClr val="0000FF"/>
                 </a:solidFill>
                 <a:latin typeface="Consolas" panose="020B0609020204030204" pitchFamily="49" charset="0"/>
               </a:rPr>
-              <a:t>var</a:t>
+              <a:t>let</a:t>
             </a:r>
             <a:r>
               <a:rPr lang="en-US" sz="7200" dirty="0">
@@ -42883,13 +42883,13 @@
           <a:p>
             <a:pPr lvl="1"/>
             <a:r>
-              <a:rPr lang="en-US" dirty="0" err="1">
+              <a:rPr lang="en-US" dirty="0">
                 <a:solidFill>
                   <a:srgbClr val="0000FF"/>
                 </a:solidFill>
                 <a:latin typeface="Consolas" panose="020B0609020204030204" pitchFamily="49" charset="0"/>
               </a:rPr>
-              <a:t>var</a:t>
+              <a:t>let</a:t>
             </a:r>
             <a:r>
               <a:rPr lang="en-US" dirty="0">
@@ -42934,13 +42934,13 @@
           <a:p>
             <a:pPr lvl="1"/>
             <a:r>
-              <a:rPr lang="en-US" dirty="0" err="1">
+              <a:rPr lang="en-US" dirty="0">
                 <a:solidFill>
                   <a:srgbClr val="0000FF"/>
                 </a:solidFill>
                 <a:latin typeface="Consolas" panose="020B0609020204030204" pitchFamily="49" charset="0"/>
               </a:rPr>
-              <a:t>var</a:t>
+              <a:t>let</a:t>
             </a:r>
             <a:r>
               <a:rPr lang="en-US" dirty="0">
@@ -43006,7 +43006,7 @@
                 </a:solidFill>
                 <a:latin typeface="Consolas" panose="020B0609020204030204" pitchFamily="49" charset="0"/>
               </a:rPr>
-              <a:t>var</a:t>
+              <a:t>let</a:t>
             </a:r>
             <a:r>
               <a:rPr lang="en-US" dirty="0">
@@ -43045,7 +43045,7 @@
                 </a:solidFill>
                 <a:latin typeface="Consolas" panose="020B0609020204030204" pitchFamily="49" charset="0"/>
               </a:rPr>
-              <a:t>var</a:t>
+              <a:t>let</a:t>
             </a:r>
             <a:r>
               <a:rPr lang="en-US" dirty="0">

</xml_diff>